<commit_message>
soutenance, ça avance !
</commit_message>
<xml_diff>
--- a/soutenance.pptx
+++ b/soutenance.pptx
@@ -5,7 +5,7 @@
     <p:sldMasterId id="2147483648" r:id="rId1"/>
   </p:sldMasterIdLst>
   <p:notesMasterIdLst>
-    <p:notesMasterId r:id="rId10"/>
+    <p:notesMasterId r:id="rId15"/>
   </p:notesMasterIdLst>
   <p:sldIdLst>
     <p:sldId id="256" r:id="rId2"/>
@@ -14,8 +14,13 @@
     <p:sldId id="258" r:id="rId5"/>
     <p:sldId id="262" r:id="rId6"/>
     <p:sldId id="259" r:id="rId7"/>
-    <p:sldId id="263" r:id="rId8"/>
-    <p:sldId id="260" r:id="rId9"/>
+    <p:sldId id="265" r:id="rId8"/>
+    <p:sldId id="264" r:id="rId9"/>
+    <p:sldId id="266" r:id="rId10"/>
+    <p:sldId id="263" r:id="rId11"/>
+    <p:sldId id="260" r:id="rId12"/>
+    <p:sldId id="268" r:id="rId13"/>
+    <p:sldId id="267" r:id="rId14"/>
   </p:sldIdLst>
   <p:sldSz cx="12192000" cy="6858000"/>
   <p:notesSz cx="6858000" cy="9144000"/>
@@ -122,6 +127,18 @@
 </p:presentation>
 </file>
 
+<file path=ppt/commentAuthors.xml><?xml version="1.0" encoding="utf-8"?>
+<p:cmAuthorLst xmlns:a="http://schemas.openxmlformats.org/drawingml/2006/main" xmlns:r="http://schemas.openxmlformats.org/officeDocument/2006/relationships" xmlns:p="http://schemas.openxmlformats.org/presentationml/2006/main">
+  <p:cmAuthor id="1" name="CCCCC" initials="C" lastIdx="1" clrIdx="0">
+    <p:extLst>
+      <p:ext uri="{19B8F6BF-5375-455C-9EA6-DF929625EA0E}">
+        <p15:presenceInfo xmlns:p15="http://schemas.microsoft.com/office/powerpoint/2012/main" userId="CCCCC" providerId="None"/>
+      </p:ext>
+    </p:extLst>
+  </p:cmAuthor>
+</p:cmAuthorLst>
+</file>
+
 <file path=ppt/notesMasters/notesMaster1.xml><?xml version="1.0" encoding="utf-8"?>
 <p:notesMaster xmlns:a="http://schemas.openxmlformats.org/drawingml/2006/main" xmlns:r="http://schemas.openxmlformats.org/officeDocument/2006/relationships" xmlns:p="http://schemas.openxmlformats.org/presentationml/2006/main">
   <p:cSld>
@@ -363,7 +380,7 @@
           <a:p>
             <a:fld id="{0657CA3B-C571-4D70-8712-24BEC4CFA193}" type="slidenum">
               <a:rPr lang="fr-FR" smtClean="0"/>
-              <a:t>‹N°›</a:t>
+              <a:t>‹#›</a:t>
             </a:fld>
             <a:endParaRPr lang="fr-FR"/>
           </a:p>
@@ -763,6 +780,14 @@
           <a:bodyPr/>
           <a:lstStyle/>
           <a:p>
+            <a:r>
+              <a:rPr lang="fr-FR" dirty="0" smtClean="0"/>
+              <a:t>Différentes fonctionnalités dans un</a:t>
+            </a:r>
+            <a:r>
+              <a:rPr lang="fr-FR" baseline="0" dirty="0" smtClean="0"/>
+              <a:t> composant =&gt; différents champs dans le STATE</a:t>
+            </a:r>
             <a:endParaRPr lang="fr-FR" dirty="0"/>
           </a:p>
         </p:txBody>
@@ -794,6 +819,385 @@
     <p:extLst>
       <p:ext uri="{BB962C8B-B14F-4D97-AF65-F5344CB8AC3E}">
         <p14:creationId xmlns:p14="http://schemas.microsoft.com/office/powerpoint/2010/main" val="1456716287"/>
+      </p:ext>
+    </p:extLst>
+  </p:cSld>
+  <p:clrMapOvr>
+    <a:masterClrMapping/>
+  </p:clrMapOvr>
+</p:notes>
+</file>
+
+<file path=ppt/notesSlides/notesSlide4.xml><?xml version="1.0" encoding="utf-8"?>
+<p:notes xmlns:a="http://schemas.openxmlformats.org/drawingml/2006/main" xmlns:r="http://schemas.openxmlformats.org/officeDocument/2006/relationships" xmlns:p="http://schemas.openxmlformats.org/presentationml/2006/main">
+  <p:cSld>
+    <p:spTree>
+      <p:nvGrpSpPr>
+        <p:cNvPr id="1" name=""/>
+        <p:cNvGrpSpPr/>
+        <p:nvPr/>
+      </p:nvGrpSpPr>
+      <p:grpSpPr>
+        <a:xfrm>
+          <a:off x="0" y="0"/>
+          <a:ext cx="0" cy="0"/>
+          <a:chOff x="0" y="0"/>
+          <a:chExt cx="0" cy="0"/>
+        </a:xfrm>
+      </p:grpSpPr>
+      <p:sp>
+        <p:nvSpPr>
+          <p:cNvPr id="2" name="Slide Image Placeholder 1"/>
+          <p:cNvSpPr>
+            <a:spLocks noGrp="1" noRot="1" noChangeAspect="1"/>
+          </p:cNvSpPr>
+          <p:nvPr>
+            <p:ph type="sldImg"/>
+          </p:nvPr>
+        </p:nvSpPr>
+        <p:spPr/>
+      </p:sp>
+      <p:sp>
+        <p:nvSpPr>
+          <p:cNvPr id="3" name="Notes Placeholder 2"/>
+          <p:cNvSpPr>
+            <a:spLocks noGrp="1"/>
+          </p:cNvSpPr>
+          <p:nvPr>
+            <p:ph type="body" idx="1"/>
+          </p:nvPr>
+        </p:nvSpPr>
+        <p:spPr/>
+        <p:txBody>
+          <a:bodyPr/>
+          <a:lstStyle/>
+          <a:p>
+            <a:r>
+              <a:rPr lang="fr-FR" dirty="0" err="1" smtClean="0"/>
+              <a:t>Stateful</a:t>
+            </a:r>
+            <a:r>
+              <a:rPr lang="fr-FR" dirty="0" smtClean="0"/>
+              <a:t> =&gt; nécessite l’utilisation d’un state</a:t>
+            </a:r>
+            <a:endParaRPr lang="fr-FR" dirty="0"/>
+          </a:p>
+        </p:txBody>
+      </p:sp>
+      <p:sp>
+        <p:nvSpPr>
+          <p:cNvPr id="4" name="Slide Number Placeholder 3"/>
+          <p:cNvSpPr>
+            <a:spLocks noGrp="1"/>
+          </p:cNvSpPr>
+          <p:nvPr>
+            <p:ph type="sldNum" sz="quarter" idx="10"/>
+          </p:nvPr>
+        </p:nvSpPr>
+        <p:spPr/>
+        <p:txBody>
+          <a:bodyPr/>
+          <a:lstStyle/>
+          <a:p>
+            <a:fld id="{0657CA3B-C571-4D70-8712-24BEC4CFA193}" type="slidenum">
+              <a:rPr lang="fr-FR" smtClean="0"/>
+              <a:t>5</a:t>
+            </a:fld>
+            <a:endParaRPr lang="fr-FR"/>
+          </a:p>
+        </p:txBody>
+      </p:sp>
+    </p:spTree>
+    <p:extLst>
+      <p:ext uri="{BB962C8B-B14F-4D97-AF65-F5344CB8AC3E}">
+        <p14:creationId xmlns:p14="http://schemas.microsoft.com/office/powerpoint/2010/main" val="4061966379"/>
+      </p:ext>
+    </p:extLst>
+  </p:cSld>
+  <p:clrMapOvr>
+    <a:masterClrMapping/>
+  </p:clrMapOvr>
+</p:notes>
+</file>
+
+<file path=ppt/notesSlides/notesSlide5.xml><?xml version="1.0" encoding="utf-8"?>
+<p:notes xmlns:a="http://schemas.openxmlformats.org/drawingml/2006/main" xmlns:r="http://schemas.openxmlformats.org/officeDocument/2006/relationships" xmlns:p="http://schemas.openxmlformats.org/presentationml/2006/main">
+  <p:cSld>
+    <p:spTree>
+      <p:nvGrpSpPr>
+        <p:cNvPr id="1" name=""/>
+        <p:cNvGrpSpPr/>
+        <p:nvPr/>
+      </p:nvGrpSpPr>
+      <p:grpSpPr>
+        <a:xfrm>
+          <a:off x="0" y="0"/>
+          <a:ext cx="0" cy="0"/>
+          <a:chOff x="0" y="0"/>
+          <a:chExt cx="0" cy="0"/>
+        </a:xfrm>
+      </p:grpSpPr>
+      <p:sp>
+        <p:nvSpPr>
+          <p:cNvPr id="2" name="Slide Image Placeholder 1"/>
+          <p:cNvSpPr>
+            <a:spLocks noGrp="1" noRot="1" noChangeAspect="1"/>
+          </p:cNvSpPr>
+          <p:nvPr>
+            <p:ph type="sldImg"/>
+          </p:nvPr>
+        </p:nvSpPr>
+        <p:spPr/>
+      </p:sp>
+      <p:sp>
+        <p:nvSpPr>
+          <p:cNvPr id="3" name="Notes Placeholder 2"/>
+          <p:cNvSpPr>
+            <a:spLocks noGrp="1"/>
+          </p:cNvSpPr>
+          <p:nvPr>
+            <p:ph type="body" idx="1"/>
+          </p:nvPr>
+        </p:nvSpPr>
+        <p:spPr/>
+        <p:txBody>
+          <a:bodyPr/>
+          <a:lstStyle/>
+          <a:p>
+            <a:r>
+              <a:rPr lang="fr-FR" dirty="0" smtClean="0"/>
+              <a:t>Abstraction</a:t>
+            </a:r>
+            <a:r>
+              <a:rPr lang="fr-FR" baseline="0" dirty="0" smtClean="0"/>
+              <a:t> state =&gt; </a:t>
+            </a:r>
+            <a:endParaRPr lang="fr-FR" dirty="0"/>
+          </a:p>
+        </p:txBody>
+      </p:sp>
+      <p:sp>
+        <p:nvSpPr>
+          <p:cNvPr id="4" name="Slide Number Placeholder 3"/>
+          <p:cNvSpPr>
+            <a:spLocks noGrp="1"/>
+          </p:cNvSpPr>
+          <p:nvPr>
+            <p:ph type="sldNum" sz="quarter" idx="10"/>
+          </p:nvPr>
+        </p:nvSpPr>
+        <p:spPr/>
+        <p:txBody>
+          <a:bodyPr/>
+          <a:lstStyle/>
+          <a:p>
+            <a:fld id="{0657CA3B-C571-4D70-8712-24BEC4CFA193}" type="slidenum">
+              <a:rPr lang="fr-FR" smtClean="0"/>
+              <a:t>6</a:t>
+            </a:fld>
+            <a:endParaRPr lang="fr-FR"/>
+          </a:p>
+        </p:txBody>
+      </p:sp>
+    </p:spTree>
+    <p:extLst>
+      <p:ext uri="{BB962C8B-B14F-4D97-AF65-F5344CB8AC3E}">
+        <p14:creationId xmlns:p14="http://schemas.microsoft.com/office/powerpoint/2010/main" val="2912110552"/>
+      </p:ext>
+    </p:extLst>
+  </p:cSld>
+  <p:clrMapOvr>
+    <a:masterClrMapping/>
+  </p:clrMapOvr>
+</p:notes>
+</file>
+
+<file path=ppt/notesSlides/notesSlide6.xml><?xml version="1.0" encoding="utf-8"?>
+<p:notes xmlns:a="http://schemas.openxmlformats.org/drawingml/2006/main" xmlns:r="http://schemas.openxmlformats.org/officeDocument/2006/relationships" xmlns:p="http://schemas.openxmlformats.org/presentationml/2006/main">
+  <p:cSld>
+    <p:spTree>
+      <p:nvGrpSpPr>
+        <p:cNvPr id="1" name=""/>
+        <p:cNvGrpSpPr/>
+        <p:nvPr/>
+      </p:nvGrpSpPr>
+      <p:grpSpPr>
+        <a:xfrm>
+          <a:off x="0" y="0"/>
+          <a:ext cx="0" cy="0"/>
+          <a:chOff x="0" y="0"/>
+          <a:chExt cx="0" cy="0"/>
+        </a:xfrm>
+      </p:grpSpPr>
+      <p:sp>
+        <p:nvSpPr>
+          <p:cNvPr id="2" name="Slide Image Placeholder 1"/>
+          <p:cNvSpPr>
+            <a:spLocks noGrp="1" noRot="1" noChangeAspect="1"/>
+          </p:cNvSpPr>
+          <p:nvPr>
+            <p:ph type="sldImg"/>
+          </p:nvPr>
+        </p:nvSpPr>
+        <p:spPr/>
+      </p:sp>
+      <p:sp>
+        <p:nvSpPr>
+          <p:cNvPr id="3" name="Notes Placeholder 2"/>
+          <p:cNvSpPr>
+            <a:spLocks noGrp="1"/>
+          </p:cNvSpPr>
+          <p:nvPr>
+            <p:ph type="body" idx="1"/>
+          </p:nvPr>
+        </p:nvSpPr>
+        <p:spPr/>
+        <p:txBody>
+          <a:bodyPr/>
+          <a:lstStyle/>
+          <a:p>
+            <a:r>
+              <a:rPr lang="fr-FR" dirty="0" smtClean="0"/>
+              <a:t>Remise</a:t>
+            </a:r>
+            <a:r>
+              <a:rPr lang="fr-FR" baseline="0" dirty="0" smtClean="0"/>
+              <a:t> à la valeur initiale sans recopie de code</a:t>
+            </a:r>
+            <a:endParaRPr lang="fr-FR" dirty="0"/>
+          </a:p>
+        </p:txBody>
+      </p:sp>
+      <p:sp>
+        <p:nvSpPr>
+          <p:cNvPr id="4" name="Slide Number Placeholder 3"/>
+          <p:cNvSpPr>
+            <a:spLocks noGrp="1"/>
+          </p:cNvSpPr>
+          <p:nvPr>
+            <p:ph type="sldNum" sz="quarter" idx="10"/>
+          </p:nvPr>
+        </p:nvSpPr>
+        <p:spPr/>
+        <p:txBody>
+          <a:bodyPr/>
+          <a:lstStyle/>
+          <a:p>
+            <a:fld id="{0657CA3B-C571-4D70-8712-24BEC4CFA193}" type="slidenum">
+              <a:rPr lang="fr-FR" smtClean="0"/>
+              <a:t>7</a:t>
+            </a:fld>
+            <a:endParaRPr lang="fr-FR"/>
+          </a:p>
+        </p:txBody>
+      </p:sp>
+    </p:spTree>
+    <p:extLst>
+      <p:ext uri="{BB962C8B-B14F-4D97-AF65-F5344CB8AC3E}">
+        <p14:creationId xmlns:p14="http://schemas.microsoft.com/office/powerpoint/2010/main" val="1486343389"/>
+      </p:ext>
+    </p:extLst>
+  </p:cSld>
+  <p:clrMapOvr>
+    <a:masterClrMapping/>
+  </p:clrMapOvr>
+</p:notes>
+</file>
+
+<file path=ppt/notesSlides/notesSlide7.xml><?xml version="1.0" encoding="utf-8"?>
+<p:notes xmlns:a="http://schemas.openxmlformats.org/drawingml/2006/main" xmlns:r="http://schemas.openxmlformats.org/officeDocument/2006/relationships" xmlns:p="http://schemas.openxmlformats.org/presentationml/2006/main">
+  <p:cSld>
+    <p:spTree>
+      <p:nvGrpSpPr>
+        <p:cNvPr id="1" name=""/>
+        <p:cNvGrpSpPr/>
+        <p:nvPr/>
+      </p:nvGrpSpPr>
+      <p:grpSpPr>
+        <a:xfrm>
+          <a:off x="0" y="0"/>
+          <a:ext cx="0" cy="0"/>
+          <a:chOff x="0" y="0"/>
+          <a:chExt cx="0" cy="0"/>
+        </a:xfrm>
+      </p:grpSpPr>
+      <p:sp>
+        <p:nvSpPr>
+          <p:cNvPr id="2" name="Slide Image Placeholder 1"/>
+          <p:cNvSpPr>
+            <a:spLocks noGrp="1" noRot="1" noChangeAspect="1"/>
+          </p:cNvSpPr>
+          <p:nvPr>
+            <p:ph type="sldImg"/>
+          </p:nvPr>
+        </p:nvSpPr>
+        <p:spPr/>
+      </p:sp>
+      <p:sp>
+        <p:nvSpPr>
+          <p:cNvPr id="3" name="Notes Placeholder 2"/>
+          <p:cNvSpPr>
+            <a:spLocks noGrp="1"/>
+          </p:cNvSpPr>
+          <p:nvPr>
+            <p:ph type="body" idx="1"/>
+          </p:nvPr>
+        </p:nvSpPr>
+        <p:spPr/>
+        <p:txBody>
+          <a:bodyPr/>
+          <a:lstStyle/>
+          <a:p>
+            <a:r>
+              <a:rPr lang="fr-FR" dirty="0" smtClean="0"/>
+              <a:t>Développement d’une liste de choses à faire</a:t>
+            </a:r>
+          </a:p>
+          <a:p>
+            <a:endParaRPr lang="fr-FR" dirty="0" smtClean="0"/>
+          </a:p>
+          <a:p>
+            <a:r>
+              <a:rPr lang="fr-FR" dirty="0" smtClean="0"/>
+              <a:t>Implémentation classique dans un premier temps</a:t>
+            </a:r>
+          </a:p>
+          <a:p>
+            <a:r>
+              <a:rPr lang="fr-FR" dirty="0" smtClean="0"/>
+              <a:t>-fonctions de gestion</a:t>
+            </a:r>
+            <a:endParaRPr lang="fr-FR" dirty="0"/>
+          </a:p>
+        </p:txBody>
+      </p:sp>
+      <p:sp>
+        <p:nvSpPr>
+          <p:cNvPr id="4" name="Slide Number Placeholder 3"/>
+          <p:cNvSpPr>
+            <a:spLocks noGrp="1"/>
+          </p:cNvSpPr>
+          <p:nvPr>
+            <p:ph type="sldNum" sz="quarter" idx="10"/>
+          </p:nvPr>
+        </p:nvSpPr>
+        <p:spPr/>
+        <p:txBody>
+          <a:bodyPr/>
+          <a:lstStyle/>
+          <a:p>
+            <a:fld id="{0657CA3B-C571-4D70-8712-24BEC4CFA193}" type="slidenum">
+              <a:rPr lang="fr-FR" smtClean="0"/>
+              <a:t>8</a:t>
+            </a:fld>
+            <a:endParaRPr lang="fr-FR"/>
+          </a:p>
+        </p:txBody>
+      </p:sp>
+    </p:spTree>
+    <p:extLst>
+      <p:ext uri="{BB962C8B-B14F-4D97-AF65-F5344CB8AC3E}">
+        <p14:creationId xmlns:p14="http://schemas.microsoft.com/office/powerpoint/2010/main" val="3711016415"/>
       </p:ext>
     </p:extLst>
   </p:cSld>
@@ -1523,9 +1927,8 @@
           <a:bodyPr/>
           <a:lstStyle/>
           <a:p>
-            <a:fld id="{B61BEF0D-F0BB-DE4B-95CE-6DB70DBA9567}" type="datetimeFigureOut">
-              <a:rPr lang="en-US" dirty="0"/>
-              <a:pPr/>
+            <a:fld id="{63900C82-A896-4DE8-A8E3-2D1E38E7FA3D}" type="datetime1">
+              <a:rPr lang="en-US" smtClean="0"/>
               <a:t>6/28/2017</a:t>
             </a:fld>
             <a:endParaRPr lang="en-US" dirty="0"/>
@@ -1547,6 +1950,10 @@
           <a:bodyPr/>
           <a:lstStyle/>
           <a:p>
+            <a:r>
+              <a:rPr lang="en-US" smtClean="0"/>
+              <a:t>Bois Cédric - Master WIC</a:t>
+            </a:r>
             <a:endParaRPr lang="en-US" dirty="0"/>
           </a:p>
         </p:txBody>
@@ -1569,7 +1976,7 @@
             <a:fld id="{D57F1E4F-1CFF-5643-939E-217C01CDF565}" type="slidenum">
               <a:rPr lang="en-US" dirty="0"/>
               <a:pPr/>
-              <a:t>‹N°›</a:t>
+              <a:t>‹#›</a:t>
             </a:fld>
             <a:endParaRPr lang="en-US" dirty="0"/>
           </a:p>
@@ -1771,9 +2178,8 @@
           <a:bodyPr/>
           <a:lstStyle/>
           <a:p>
-            <a:fld id="{B61BEF0D-F0BB-DE4B-95CE-6DB70DBA9567}" type="datetimeFigureOut">
-              <a:rPr lang="en-US" dirty="0"/>
-              <a:pPr/>
+            <a:fld id="{9C676D22-B730-4223-8964-664AC924586B}" type="datetime1">
+              <a:rPr lang="en-US" smtClean="0"/>
               <a:t>6/28/2017</a:t>
             </a:fld>
             <a:endParaRPr lang="en-US" dirty="0"/>
@@ -1795,6 +2201,10 @@
           <a:bodyPr/>
           <a:lstStyle/>
           <a:p>
+            <a:r>
+              <a:rPr lang="en-US" smtClean="0"/>
+              <a:t>Bois Cédric - Master WIC</a:t>
+            </a:r>
             <a:endParaRPr lang="en-US" dirty="0"/>
           </a:p>
         </p:txBody>
@@ -1817,7 +2227,7 @@
             <a:fld id="{D57F1E4F-1CFF-5643-939E-217C01CDF565}" type="slidenum">
               <a:rPr lang="en-US" dirty="0"/>
               <a:pPr/>
-              <a:t>‹N°›</a:t>
+              <a:t>‹#›</a:t>
             </a:fld>
             <a:endParaRPr lang="en-US" dirty="0"/>
           </a:p>
@@ -2082,9 +2492,8 @@
           <a:bodyPr/>
           <a:lstStyle/>
           <a:p>
-            <a:fld id="{B61BEF0D-F0BB-DE4B-95CE-6DB70DBA9567}" type="datetimeFigureOut">
-              <a:rPr lang="en-US" dirty="0"/>
-              <a:pPr/>
+            <a:fld id="{C003026D-E995-4F32-93A5-CE52920CC17F}" type="datetime1">
+              <a:rPr lang="en-US" smtClean="0"/>
               <a:t>6/28/2017</a:t>
             </a:fld>
             <a:endParaRPr lang="en-US" dirty="0"/>
@@ -2106,6 +2515,10 @@
           <a:bodyPr/>
           <a:lstStyle/>
           <a:p>
+            <a:r>
+              <a:rPr lang="en-US" smtClean="0"/>
+              <a:t>Bois Cédric - Master WIC</a:t>
+            </a:r>
             <a:endParaRPr lang="en-US" dirty="0"/>
           </a:p>
         </p:txBody>
@@ -2128,7 +2541,7 @@
             <a:fld id="{D57F1E4F-1CFF-5643-939E-217C01CDF565}" type="slidenum">
               <a:rPr lang="en-US" dirty="0"/>
               <a:pPr/>
-              <a:t>‹N°›</a:t>
+              <a:t>‹#›</a:t>
             </a:fld>
             <a:endParaRPr lang="en-US" dirty="0"/>
           </a:p>
@@ -2420,9 +2833,8 @@
           <a:bodyPr/>
           <a:lstStyle/>
           <a:p>
-            <a:fld id="{B61BEF0D-F0BB-DE4B-95CE-6DB70DBA9567}" type="datetimeFigureOut">
-              <a:rPr lang="en-US" dirty="0"/>
-              <a:pPr/>
+            <a:fld id="{B23BE740-A13A-42ED-8C1E-B1E0E21EC01E}" type="datetime1">
+              <a:rPr lang="en-US" smtClean="0"/>
               <a:t>6/28/2017</a:t>
             </a:fld>
             <a:endParaRPr lang="en-US" dirty="0"/>
@@ -2444,6 +2856,10 @@
           <a:bodyPr/>
           <a:lstStyle/>
           <a:p>
+            <a:r>
+              <a:rPr lang="en-US" smtClean="0"/>
+              <a:t>Bois Cédric - Master WIC</a:t>
+            </a:r>
             <a:endParaRPr lang="en-US" dirty="0"/>
           </a:p>
         </p:txBody>
@@ -2466,7 +2882,7 @@
             <a:fld id="{D57F1E4F-1CFF-5643-939E-217C01CDF565}" type="slidenum">
               <a:rPr lang="en-US" dirty="0"/>
               <a:pPr/>
-              <a:t>‹N°›</a:t>
+              <a:t>‹#›</a:t>
             </a:fld>
             <a:endParaRPr lang="en-US" dirty="0"/>
           </a:p>
@@ -2731,9 +3147,8 @@
           <a:bodyPr/>
           <a:lstStyle/>
           <a:p>
-            <a:fld id="{B61BEF0D-F0BB-DE4B-95CE-6DB70DBA9567}" type="datetimeFigureOut">
-              <a:rPr lang="en-US" dirty="0"/>
-              <a:pPr/>
+            <a:fld id="{D9318CF3-4A27-4F25-A0F8-0BDF06A3B765}" type="datetime1">
+              <a:rPr lang="en-US" smtClean="0"/>
               <a:t>6/28/2017</a:t>
             </a:fld>
             <a:endParaRPr lang="en-US" dirty="0"/>
@@ -2755,6 +3170,10 @@
           <a:bodyPr/>
           <a:lstStyle/>
           <a:p>
+            <a:r>
+              <a:rPr lang="en-US" smtClean="0"/>
+              <a:t>Bois Cédric - Master WIC</a:t>
+            </a:r>
             <a:endParaRPr lang="en-US" dirty="0"/>
           </a:p>
         </p:txBody>
@@ -2777,7 +3196,7 @@
             <a:fld id="{D57F1E4F-1CFF-5643-939E-217C01CDF565}" type="slidenum">
               <a:rPr lang="en-US" dirty="0"/>
               <a:pPr/>
-              <a:t>‹N°›</a:t>
+              <a:t>‹#›</a:t>
             </a:fld>
             <a:endParaRPr lang="en-US" dirty="0"/>
           </a:p>
@@ -3121,9 +3540,8 @@
           <a:bodyPr/>
           <a:lstStyle/>
           <a:p>
-            <a:fld id="{B61BEF0D-F0BB-DE4B-95CE-6DB70DBA9567}" type="datetimeFigureOut">
-              <a:rPr lang="en-US" dirty="0"/>
-              <a:pPr/>
+            <a:fld id="{5A99F229-B8C4-4F43-A5DB-A10D43DAD398}" type="datetime1">
+              <a:rPr lang="en-US" smtClean="0"/>
               <a:t>6/28/2017</a:t>
             </a:fld>
             <a:endParaRPr lang="en-US" dirty="0"/>
@@ -3145,6 +3563,10 @@
           <a:bodyPr/>
           <a:lstStyle/>
           <a:p>
+            <a:r>
+              <a:rPr lang="en-US" smtClean="0"/>
+              <a:t>Bois Cédric - Master WIC</a:t>
+            </a:r>
             <a:endParaRPr lang="en-US" dirty="0"/>
           </a:p>
         </p:txBody>
@@ -3167,7 +3589,7 @@
             <a:fld id="{D57F1E4F-1CFF-5643-939E-217C01CDF565}" type="slidenum">
               <a:rPr lang="en-US" dirty="0"/>
               <a:pPr/>
-              <a:t>‹N°›</a:t>
+              <a:t>‹#›</a:t>
             </a:fld>
             <a:endParaRPr lang="en-US" dirty="0"/>
           </a:p>
@@ -3288,8 +3710,8 @@
           <a:bodyPr/>
           <a:lstStyle/>
           <a:p>
-            <a:fld id="{55C6B4A9-1611-4792-9094-5F34BCA07E0B}" type="datetimeFigureOut">
-              <a:rPr lang="en-US" dirty="0"/>
+            <a:fld id="{AB98E4B4-D3A3-4161-BAEC-27D6DCEC7CED}" type="datetime1">
+              <a:rPr lang="en-US" smtClean="0"/>
               <a:t>6/28/2017</a:t>
             </a:fld>
             <a:endParaRPr lang="en-US" dirty="0"/>
@@ -3311,6 +3733,10 @@
           <a:bodyPr/>
           <a:lstStyle/>
           <a:p>
+            <a:r>
+              <a:rPr lang="en-US" smtClean="0"/>
+              <a:t>Bois Cédric - Master WIC</a:t>
+            </a:r>
             <a:endParaRPr lang="en-US" dirty="0"/>
           </a:p>
         </p:txBody>
@@ -3332,7 +3758,7 @@
           <a:p>
             <a:fld id="{89333C77-0158-454C-844F-B7AB9BD7DAD4}" type="slidenum">
               <a:rPr lang="en-US" dirty="0"/>
-              <a:t>‹N°›</a:t>
+              <a:t>‹#›</a:t>
             </a:fld>
             <a:endParaRPr lang="en-US" dirty="0"/>
           </a:p>
@@ -3463,9 +3889,8 @@
           <a:bodyPr/>
           <a:lstStyle/>
           <a:p>
-            <a:fld id="{B61BEF0D-F0BB-DE4B-95CE-6DB70DBA9567}" type="datetimeFigureOut">
-              <a:rPr lang="en-US" dirty="0"/>
-              <a:pPr/>
+            <a:fld id="{931EDA62-39B5-4812-A3F5-036F94BDE2E8}" type="datetime1">
+              <a:rPr lang="en-US" smtClean="0"/>
               <a:t>6/28/2017</a:t>
             </a:fld>
             <a:endParaRPr lang="en-US" dirty="0"/>
@@ -3487,6 +3912,10 @@
           <a:bodyPr/>
           <a:lstStyle/>
           <a:p>
+            <a:r>
+              <a:rPr lang="en-US" smtClean="0"/>
+              <a:t>Bois Cédric - Master WIC</a:t>
+            </a:r>
             <a:endParaRPr lang="en-US" dirty="0"/>
           </a:p>
         </p:txBody>
@@ -3509,7 +3938,7 @@
             <a:fld id="{D57F1E4F-1CFF-5643-939E-217C01CDF565}" type="slidenum">
               <a:rPr lang="en-US" dirty="0"/>
               <a:pPr/>
-              <a:t>‹N°›</a:t>
+              <a:t>‹#›</a:t>
             </a:fld>
             <a:endParaRPr lang="en-US" dirty="0"/>
           </a:p>
@@ -3636,9 +4065,8 @@
           <a:bodyPr/>
           <a:lstStyle/>
           <a:p>
-            <a:fld id="{B61BEF0D-F0BB-DE4B-95CE-6DB70DBA9567}" type="datetimeFigureOut">
-              <a:rPr lang="en-US" dirty="0"/>
-              <a:pPr/>
+            <a:fld id="{36EA2C8A-79EB-498B-919B-F34FCE235126}" type="datetime1">
+              <a:rPr lang="en-US" smtClean="0"/>
               <a:t>6/28/2017</a:t>
             </a:fld>
             <a:endParaRPr lang="en-US" dirty="0"/>
@@ -3660,6 +4088,10 @@
           <a:bodyPr/>
           <a:lstStyle/>
           <a:p>
+            <a:r>
+              <a:rPr lang="en-US" smtClean="0"/>
+              <a:t>Bois Cédric - Master WIC</a:t>
+            </a:r>
             <a:endParaRPr lang="en-US" dirty="0"/>
           </a:p>
         </p:txBody>
@@ -3682,7 +4114,7 @@
             <a:fld id="{D57F1E4F-1CFF-5643-939E-217C01CDF565}" type="slidenum">
               <a:rPr lang="en-US" dirty="0"/>
               <a:pPr/>
-              <a:t>‹N°›</a:t>
+              <a:t>‹#›</a:t>
             </a:fld>
             <a:endParaRPr lang="en-US" dirty="0"/>
           </a:p>
@@ -3880,9 +4312,8 @@
           <a:bodyPr/>
           <a:lstStyle/>
           <a:p>
-            <a:fld id="{B61BEF0D-F0BB-DE4B-95CE-6DB70DBA9567}" type="datetimeFigureOut">
-              <a:rPr lang="en-US" dirty="0"/>
-              <a:pPr/>
+            <a:fld id="{55533B15-B0B3-4E2F-9D27-46AA9F529301}" type="datetime1">
+              <a:rPr lang="en-US" smtClean="0"/>
               <a:t>6/28/2017</a:t>
             </a:fld>
             <a:endParaRPr lang="en-US" dirty="0"/>
@@ -3904,6 +4335,10 @@
           <a:bodyPr/>
           <a:lstStyle/>
           <a:p>
+            <a:r>
+              <a:rPr lang="en-US" smtClean="0"/>
+              <a:t>Bois Cédric - Master WIC</a:t>
+            </a:r>
             <a:endParaRPr lang="en-US" dirty="0"/>
           </a:p>
         </p:txBody>
@@ -3926,7 +4361,7 @@
             <a:fld id="{D57F1E4F-1CFF-5643-939E-217C01CDF565}" type="slidenum">
               <a:rPr lang="en-US" dirty="0"/>
               <a:pPr/>
-              <a:t>‹N°›</a:t>
+              <a:t>‹#›</a:t>
             </a:fld>
             <a:endParaRPr lang="en-US" dirty="0"/>
           </a:p>
@@ -4109,8 +4544,8 @@
           <a:bodyPr/>
           <a:lstStyle/>
           <a:p>
-            <a:fld id="{EB712588-04B1-427B-82EE-E8DB90309F08}" type="datetimeFigureOut">
-              <a:rPr lang="en-US" dirty="0"/>
+            <a:fld id="{85A2D822-A24F-408F-822A-0E344E05EA75}" type="datetime1">
+              <a:rPr lang="en-US" smtClean="0"/>
               <a:t>6/28/2017</a:t>
             </a:fld>
             <a:endParaRPr lang="en-US" dirty="0"/>
@@ -4132,6 +4567,10 @@
           <a:bodyPr/>
           <a:lstStyle/>
           <a:p>
+            <a:r>
+              <a:rPr lang="en-US" smtClean="0"/>
+              <a:t>Bois Cédric - Master WIC</a:t>
+            </a:r>
             <a:endParaRPr lang="en-US" dirty="0"/>
           </a:p>
         </p:txBody>
@@ -4153,7 +4592,7 @@
           <a:p>
             <a:fld id="{6FF9F0C5-380F-41C2-899A-BAC0F0927E16}" type="slidenum">
               <a:rPr lang="en-US" dirty="0"/>
-              <a:t>‹N°›</a:t>
+              <a:t>‹#›</a:t>
             </a:fld>
             <a:endParaRPr lang="en-US" dirty="0"/>
           </a:p>
@@ -4478,9 +4917,8 @@
           <a:bodyPr/>
           <a:lstStyle/>
           <a:p>
-            <a:fld id="{B61BEF0D-F0BB-DE4B-95CE-6DB70DBA9567}" type="datetimeFigureOut">
-              <a:rPr lang="en-US" dirty="0"/>
-              <a:pPr/>
+            <a:fld id="{0D6ABC60-4846-45BB-9962-BEC6BD89B9A5}" type="datetime1">
+              <a:rPr lang="en-US" smtClean="0"/>
               <a:t>6/28/2017</a:t>
             </a:fld>
             <a:endParaRPr lang="en-US" dirty="0"/>
@@ -4502,6 +4940,10 @@
           <a:bodyPr/>
           <a:lstStyle/>
           <a:p>
+            <a:r>
+              <a:rPr lang="en-US" smtClean="0"/>
+              <a:t>Bois Cédric - Master WIC</a:t>
+            </a:r>
             <a:endParaRPr lang="en-US" dirty="0"/>
           </a:p>
         </p:txBody>
@@ -4524,7 +4966,7 @@
             <a:fld id="{D57F1E4F-1CFF-5643-939E-217C01CDF565}" type="slidenum">
               <a:rPr lang="en-US" dirty="0"/>
               <a:pPr/>
-              <a:t>‹N°›</a:t>
+              <a:t>‹#›</a:t>
             </a:fld>
             <a:endParaRPr lang="en-US" dirty="0"/>
           </a:p>
@@ -4598,9 +5040,8 @@
           <a:bodyPr/>
           <a:lstStyle/>
           <a:p>
-            <a:fld id="{B61BEF0D-F0BB-DE4B-95CE-6DB70DBA9567}" type="datetimeFigureOut">
-              <a:rPr lang="en-US" dirty="0"/>
-              <a:pPr/>
+            <a:fld id="{04B316C2-C98E-4032-9051-A13DBD48B70A}" type="datetime1">
+              <a:rPr lang="en-US" smtClean="0"/>
               <a:t>6/28/2017</a:t>
             </a:fld>
             <a:endParaRPr lang="en-US" dirty="0"/>
@@ -4622,6 +5063,10 @@
           <a:bodyPr/>
           <a:lstStyle/>
           <a:p>
+            <a:r>
+              <a:rPr lang="en-US" smtClean="0"/>
+              <a:t>Bois Cédric - Master WIC</a:t>
+            </a:r>
             <a:endParaRPr lang="en-US" dirty="0"/>
           </a:p>
         </p:txBody>
@@ -4644,7 +5089,7 @@
             <a:fld id="{D57F1E4F-1CFF-5643-939E-217C01CDF565}" type="slidenum">
               <a:rPr lang="en-US" dirty="0"/>
               <a:pPr/>
-              <a:t>‹N°›</a:t>
+              <a:t>‹#›</a:t>
             </a:fld>
             <a:endParaRPr lang="en-US" dirty="0"/>
           </a:p>
@@ -4690,9 +5135,8 @@
           <a:bodyPr/>
           <a:lstStyle/>
           <a:p>
-            <a:fld id="{B61BEF0D-F0BB-DE4B-95CE-6DB70DBA9567}" type="datetimeFigureOut">
-              <a:rPr lang="en-US" dirty="0"/>
-              <a:pPr/>
+            <a:fld id="{77E0374F-8A8C-476E-B7A7-AA3F8529EE2D}" type="datetime1">
+              <a:rPr lang="en-US" smtClean="0"/>
               <a:t>6/28/2017</a:t>
             </a:fld>
             <a:endParaRPr lang="en-US" dirty="0"/>
@@ -4714,6 +5158,10 @@
           <a:bodyPr/>
           <a:lstStyle/>
           <a:p>
+            <a:r>
+              <a:rPr lang="en-US" smtClean="0"/>
+              <a:t>Bois Cédric - Master WIC</a:t>
+            </a:r>
             <a:endParaRPr lang="en-US" dirty="0"/>
           </a:p>
         </p:txBody>
@@ -4736,7 +5184,7 @@
             <a:fld id="{D57F1E4F-1CFF-5643-939E-217C01CDF565}" type="slidenum">
               <a:rPr lang="en-US" dirty="0"/>
               <a:pPr/>
-              <a:t>‹N°›</a:t>
+              <a:t>‹#›</a:t>
             </a:fld>
             <a:endParaRPr lang="en-US" dirty="0"/>
           </a:p>
@@ -4942,8 +5390,8 @@
           <a:bodyPr/>
           <a:lstStyle/>
           <a:p>
-            <a:fld id="{42A54C80-263E-416B-A8E0-580EDEADCBDC}" type="datetimeFigureOut">
-              <a:rPr lang="en-US" dirty="0"/>
+            <a:fld id="{9E1C093E-FBEA-46D0-8808-7D2B33F769D3}" type="datetime1">
+              <a:rPr lang="en-US" smtClean="0"/>
               <a:t>6/28/2017</a:t>
             </a:fld>
             <a:endParaRPr lang="en-US" dirty="0"/>
@@ -4965,6 +5413,10 @@
           <a:bodyPr/>
           <a:lstStyle/>
           <a:p>
+            <a:r>
+              <a:rPr lang="en-US" smtClean="0"/>
+              <a:t>Bois Cédric - Master WIC</a:t>
+            </a:r>
             <a:endParaRPr lang="en-US" dirty="0"/>
           </a:p>
         </p:txBody>
@@ -4986,7 +5438,7 @@
           <a:p>
             <a:fld id="{519954A3-9DFD-4C44-94BA-B95130A3BA1C}" type="slidenum">
               <a:rPr lang="en-US" dirty="0"/>
-              <a:t>‹N°›</a:t>
+              <a:t>‹#›</a:t>
             </a:fld>
             <a:endParaRPr lang="en-US" dirty="0"/>
           </a:p>
@@ -5200,9 +5652,8 @@
           <a:bodyPr/>
           <a:lstStyle/>
           <a:p>
-            <a:fld id="{B61BEF0D-F0BB-DE4B-95CE-6DB70DBA9567}" type="datetimeFigureOut">
-              <a:rPr lang="en-US" dirty="0"/>
-              <a:pPr/>
+            <a:fld id="{CBFB7E00-8915-4DCE-BFC0-ED88A6E2A29E}" type="datetime1">
+              <a:rPr lang="en-US" smtClean="0"/>
               <a:t>6/28/2017</a:t>
             </a:fld>
             <a:endParaRPr lang="en-US" dirty="0"/>
@@ -5224,6 +5675,10 @@
           <a:bodyPr/>
           <a:lstStyle/>
           <a:p>
+            <a:r>
+              <a:rPr lang="en-US" smtClean="0"/>
+              <a:t>Bois Cédric - Master WIC</a:t>
+            </a:r>
             <a:endParaRPr lang="en-US" dirty="0"/>
           </a:p>
         </p:txBody>
@@ -5246,7 +5701,7 @@
             <a:fld id="{D57F1E4F-1CFF-5643-939E-217C01CDF565}" type="slidenum">
               <a:rPr lang="en-US" dirty="0"/>
               <a:pPr/>
-              <a:t>‹N°›</a:t>
+              <a:t>‹#›</a:t>
             </a:fld>
             <a:endParaRPr lang="en-US" dirty="0"/>
           </a:p>
@@ -5940,9 +6395,8 @@
             </a:lvl1pPr>
           </a:lstStyle>
           <a:p>
-            <a:fld id="{B61BEF0D-F0BB-DE4B-95CE-6DB70DBA9567}" type="datetimeFigureOut">
-              <a:rPr lang="en-US" dirty="0"/>
-              <a:pPr/>
+            <a:fld id="{91897A87-A690-4C68-80C1-C84EE91EBAF0}" type="datetime1">
+              <a:rPr lang="en-US" smtClean="0"/>
               <a:t>6/28/2017</a:t>
             </a:fld>
             <a:endParaRPr lang="en-US" dirty="0"/>
@@ -5982,6 +6436,10 @@
             </a:lvl1pPr>
           </a:lstStyle>
           <a:p>
+            <a:r>
+              <a:rPr lang="en-US" smtClean="0"/>
+              <a:t>Bois Cédric - Master WIC</a:t>
+            </a:r>
             <a:endParaRPr lang="en-US" dirty="0"/>
           </a:p>
         </p:txBody>
@@ -6020,7 +6478,7 @@
             <a:fld id="{D57F1E4F-1CFF-5643-939E-217C01CDF565}" type="slidenum">
               <a:rPr lang="en-US" dirty="0"/>
               <a:pPr/>
-              <a:t>‹N°›</a:t>
+              <a:t>‹#›</a:t>
             </a:fld>
             <a:endParaRPr lang="en-US" dirty="0"/>
           </a:p>
@@ -6047,6 +6505,7 @@
     <p:sldLayoutId id="2147483667" r:id="rId15"/>
     <p:sldLayoutId id="2147483659" r:id="rId16"/>
   </p:sldLayoutIdLst>
+  <p:hf hdr="0" dt="0"/>
   <p:txStyles>
     <p:titleStyle>
       <a:lvl1pPr algn="l" defTabSz="457200" rtl="0" eaLnBrk="1" latinLnBrk="0" hangingPunct="1">
@@ -6538,10 +6997,847 @@
           </a:p>
         </p:txBody>
       </p:sp>
+      <p:sp>
+        <p:nvSpPr>
+          <p:cNvPr id="4" name="Footer Placeholder 3"/>
+          <p:cNvSpPr>
+            <a:spLocks noGrp="1"/>
+          </p:cNvSpPr>
+          <p:nvPr>
+            <p:ph type="ftr" sz="quarter" idx="11"/>
+          </p:nvPr>
+        </p:nvSpPr>
+        <p:spPr/>
+        <p:txBody>
+          <a:bodyPr/>
+          <a:lstStyle/>
+          <a:p>
+            <a:r>
+              <a:rPr lang="en-US" smtClean="0"/>
+              <a:t>Bois Cédric - Master WIC</a:t>
+            </a:r>
+            <a:endParaRPr lang="en-US" dirty="0"/>
+          </a:p>
+        </p:txBody>
+      </p:sp>
+      <p:sp>
+        <p:nvSpPr>
+          <p:cNvPr id="5" name="Slide Number Placeholder 4"/>
+          <p:cNvSpPr>
+            <a:spLocks noGrp="1"/>
+          </p:cNvSpPr>
+          <p:nvPr>
+            <p:ph type="sldNum" sz="quarter" idx="12"/>
+          </p:nvPr>
+        </p:nvSpPr>
+        <p:spPr/>
+        <p:txBody>
+          <a:bodyPr/>
+          <a:lstStyle/>
+          <a:p>
+            <a:fld id="{D57F1E4F-1CFF-5643-939E-217C01CDF565}" type="slidenum">
+              <a:rPr lang="en-US" smtClean="0"/>
+              <a:pPr/>
+              <a:t>1</a:t>
+            </a:fld>
+            <a:endParaRPr lang="en-US" dirty="0"/>
+          </a:p>
+        </p:txBody>
+      </p:sp>
     </p:spTree>
     <p:extLst>
       <p:ext uri="{BB962C8B-B14F-4D97-AF65-F5344CB8AC3E}">
         <p14:creationId xmlns:p14="http://schemas.microsoft.com/office/powerpoint/2010/main" val="3805661671"/>
+      </p:ext>
+    </p:extLst>
+  </p:cSld>
+  <p:clrMapOvr>
+    <a:masterClrMapping/>
+  </p:clrMapOvr>
+  <p:timing>
+    <p:tnLst>
+      <p:par>
+        <p:cTn id="1" dur="indefinite" restart="never" nodeType="tmRoot"/>
+      </p:par>
+    </p:tnLst>
+  </p:timing>
+</p:sld>
+</file>
+
+<file path=ppt/slides/slide10.xml><?xml version="1.0" encoding="utf-8"?>
+<p:sld xmlns:a="http://schemas.openxmlformats.org/drawingml/2006/main" xmlns:r="http://schemas.openxmlformats.org/officeDocument/2006/relationships" xmlns:p="http://schemas.openxmlformats.org/presentationml/2006/main">
+  <p:cSld>
+    <p:spTree>
+      <p:nvGrpSpPr>
+        <p:cNvPr id="1" name=""/>
+        <p:cNvGrpSpPr/>
+        <p:nvPr/>
+      </p:nvGrpSpPr>
+      <p:grpSpPr>
+        <a:xfrm>
+          <a:off x="0" y="0"/>
+          <a:ext cx="0" cy="0"/>
+          <a:chOff x="0" y="0"/>
+          <a:chExt cx="0" cy="0"/>
+        </a:xfrm>
+      </p:grpSpPr>
+      <p:sp>
+        <p:nvSpPr>
+          <p:cNvPr id="2" name="Titre 1"/>
+          <p:cNvSpPr>
+            <a:spLocks noGrp="1"/>
+          </p:cNvSpPr>
+          <p:nvPr>
+            <p:ph type="title"/>
+          </p:nvPr>
+        </p:nvSpPr>
+        <p:spPr/>
+        <p:txBody>
+          <a:bodyPr/>
+          <a:lstStyle/>
+          <a:p>
+            <a:r>
+              <a:rPr lang="fr-FR" dirty="0" err="1" smtClean="0"/>
+              <a:t>withState</a:t>
+            </a:r>
+            <a:r>
+              <a:rPr lang="fr-FR" dirty="0" smtClean="0"/>
+              <a:t> : Tests</a:t>
+            </a:r>
+            <a:endParaRPr lang="fr-FR" dirty="0"/>
+          </a:p>
+        </p:txBody>
+      </p:sp>
+      <p:sp>
+        <p:nvSpPr>
+          <p:cNvPr id="3" name="Espace réservé du contenu 2"/>
+          <p:cNvSpPr>
+            <a:spLocks noGrp="1"/>
+          </p:cNvSpPr>
+          <p:nvPr>
+            <p:ph idx="1"/>
+          </p:nvPr>
+        </p:nvSpPr>
+        <p:spPr/>
+        <p:txBody>
+          <a:bodyPr/>
+          <a:lstStyle/>
+          <a:p>
+            <a:r>
+              <a:rPr lang="fr-FR" dirty="0" smtClean="0"/>
+              <a:t>Librairie </a:t>
+            </a:r>
+            <a:r>
+              <a:rPr lang="fr-FR" dirty="0" err="1" smtClean="0"/>
+              <a:t>Jest</a:t>
+            </a:r>
+            <a:endParaRPr lang="fr-FR" dirty="0"/>
+          </a:p>
+        </p:txBody>
+      </p:sp>
+      <p:sp>
+        <p:nvSpPr>
+          <p:cNvPr id="5" name="Footer Placeholder 4"/>
+          <p:cNvSpPr>
+            <a:spLocks noGrp="1"/>
+          </p:cNvSpPr>
+          <p:nvPr>
+            <p:ph type="ftr" sz="quarter" idx="11"/>
+          </p:nvPr>
+        </p:nvSpPr>
+        <p:spPr/>
+        <p:txBody>
+          <a:bodyPr/>
+          <a:lstStyle/>
+          <a:p>
+            <a:r>
+              <a:rPr lang="en-US" smtClean="0"/>
+              <a:t>Bois Cédric - Master WIC</a:t>
+            </a:r>
+            <a:endParaRPr lang="en-US" dirty="0"/>
+          </a:p>
+        </p:txBody>
+      </p:sp>
+      <p:sp>
+        <p:nvSpPr>
+          <p:cNvPr id="6" name="Slide Number Placeholder 5"/>
+          <p:cNvSpPr>
+            <a:spLocks noGrp="1"/>
+          </p:cNvSpPr>
+          <p:nvPr>
+            <p:ph type="sldNum" sz="quarter" idx="12"/>
+          </p:nvPr>
+        </p:nvSpPr>
+        <p:spPr/>
+        <p:txBody>
+          <a:bodyPr/>
+          <a:lstStyle/>
+          <a:p>
+            <a:fld id="{D57F1E4F-1CFF-5643-939E-217C01CDF565}" type="slidenum">
+              <a:rPr lang="en-US" smtClean="0"/>
+              <a:pPr/>
+              <a:t>10</a:t>
+            </a:fld>
+            <a:endParaRPr lang="en-US" dirty="0"/>
+          </a:p>
+        </p:txBody>
+      </p:sp>
+    </p:spTree>
+    <p:extLst>
+      <p:ext uri="{BB962C8B-B14F-4D97-AF65-F5344CB8AC3E}">
+        <p14:creationId xmlns:p14="http://schemas.microsoft.com/office/powerpoint/2010/main" val="3553190663"/>
+      </p:ext>
+    </p:extLst>
+  </p:cSld>
+  <p:clrMapOvr>
+    <a:masterClrMapping/>
+  </p:clrMapOvr>
+  <p:timing>
+    <p:tnLst>
+      <p:par>
+        <p:cTn id="1" dur="indefinite" restart="never" nodeType="tmRoot"/>
+      </p:par>
+    </p:tnLst>
+  </p:timing>
+</p:sld>
+</file>
+
+<file path=ppt/slides/slide11.xml><?xml version="1.0" encoding="utf-8"?>
+<p:sld xmlns:a="http://schemas.openxmlformats.org/drawingml/2006/main" xmlns:r="http://schemas.openxmlformats.org/officeDocument/2006/relationships" xmlns:p="http://schemas.openxmlformats.org/presentationml/2006/main">
+  <p:cSld>
+    <p:spTree>
+      <p:nvGrpSpPr>
+        <p:cNvPr id="1" name=""/>
+        <p:cNvGrpSpPr/>
+        <p:nvPr/>
+      </p:nvGrpSpPr>
+      <p:grpSpPr>
+        <a:xfrm>
+          <a:off x="0" y="0"/>
+          <a:ext cx="0" cy="0"/>
+          <a:chOff x="0" y="0"/>
+          <a:chExt cx="0" cy="0"/>
+        </a:xfrm>
+      </p:grpSpPr>
+      <p:sp>
+        <p:nvSpPr>
+          <p:cNvPr id="2" name="Title 1"/>
+          <p:cNvSpPr>
+            <a:spLocks noGrp="1"/>
+          </p:cNvSpPr>
+          <p:nvPr>
+            <p:ph type="title"/>
+          </p:nvPr>
+        </p:nvSpPr>
+        <p:spPr/>
+        <p:txBody>
+          <a:bodyPr/>
+          <a:lstStyle/>
+          <a:p>
+            <a:r>
+              <a:rPr lang="fr-FR" dirty="0" err="1" smtClean="0"/>
+              <a:t>Xen</a:t>
+            </a:r>
+            <a:r>
+              <a:rPr lang="fr-FR" dirty="0" smtClean="0"/>
+              <a:t> Orchestra</a:t>
+            </a:r>
+            <a:endParaRPr lang="fr-FR" dirty="0"/>
+          </a:p>
+        </p:txBody>
+      </p:sp>
+      <p:sp>
+        <p:nvSpPr>
+          <p:cNvPr id="3" name="Content Placeholder 2"/>
+          <p:cNvSpPr>
+            <a:spLocks noGrp="1"/>
+          </p:cNvSpPr>
+          <p:nvPr>
+            <p:ph idx="1"/>
+          </p:nvPr>
+        </p:nvSpPr>
+        <p:spPr/>
+        <p:txBody>
+          <a:bodyPr/>
+          <a:lstStyle/>
+          <a:p>
+            <a:r>
+              <a:rPr lang="fr-FR" dirty="0" smtClean="0"/>
+              <a:t>Gestionnaire de machines virtuelles</a:t>
+            </a:r>
+          </a:p>
+          <a:p>
+            <a:r>
+              <a:rPr lang="fr-FR" dirty="0" err="1" smtClean="0"/>
+              <a:t>XenServer</a:t>
+            </a:r>
+            <a:endParaRPr lang="fr-FR" dirty="0" smtClean="0"/>
+          </a:p>
+          <a:p>
+            <a:r>
+              <a:rPr lang="fr-FR" dirty="0" err="1" smtClean="0"/>
+              <a:t>Xapi</a:t>
+            </a:r>
+            <a:endParaRPr lang="fr-FR" dirty="0" smtClean="0"/>
+          </a:p>
+          <a:p>
+            <a:endParaRPr lang="fr-FR" dirty="0" smtClean="0"/>
+          </a:p>
+          <a:p>
+            <a:r>
+              <a:rPr lang="fr-FR" dirty="0" smtClean="0"/>
+              <a:t>Composé de trois modules :</a:t>
+            </a:r>
+          </a:p>
+          <a:p>
+            <a:pPr lvl="1"/>
+            <a:r>
+              <a:rPr lang="fr-FR" dirty="0" err="1" smtClean="0"/>
+              <a:t>Xo</a:t>
+            </a:r>
+            <a:r>
+              <a:rPr lang="fr-FR" dirty="0" smtClean="0"/>
+              <a:t>-server</a:t>
+            </a:r>
+          </a:p>
+          <a:p>
+            <a:pPr lvl="1"/>
+            <a:r>
+              <a:rPr lang="fr-FR" dirty="0" err="1" smtClean="0"/>
+              <a:t>Xo</a:t>
+            </a:r>
+            <a:r>
+              <a:rPr lang="fr-FR" dirty="0" smtClean="0"/>
+              <a:t>-web</a:t>
+            </a:r>
+          </a:p>
+          <a:p>
+            <a:pPr lvl="1"/>
+            <a:r>
+              <a:rPr lang="fr-FR" dirty="0" err="1" smtClean="0"/>
+              <a:t>Xo</a:t>
+            </a:r>
+            <a:r>
+              <a:rPr lang="fr-FR" dirty="0" smtClean="0"/>
+              <a:t>-CLI</a:t>
+            </a:r>
+            <a:endParaRPr lang="fr-FR" dirty="0"/>
+          </a:p>
+        </p:txBody>
+      </p:sp>
+      <p:sp>
+        <p:nvSpPr>
+          <p:cNvPr id="4" name="Footer Placeholder 3"/>
+          <p:cNvSpPr>
+            <a:spLocks noGrp="1"/>
+          </p:cNvSpPr>
+          <p:nvPr>
+            <p:ph type="ftr" sz="quarter" idx="11"/>
+          </p:nvPr>
+        </p:nvSpPr>
+        <p:spPr/>
+        <p:txBody>
+          <a:bodyPr/>
+          <a:lstStyle/>
+          <a:p>
+            <a:r>
+              <a:rPr lang="en-US" smtClean="0"/>
+              <a:t>Bois Cédric - Master WIC</a:t>
+            </a:r>
+            <a:endParaRPr lang="en-US" dirty="0"/>
+          </a:p>
+        </p:txBody>
+      </p:sp>
+      <p:sp>
+        <p:nvSpPr>
+          <p:cNvPr id="5" name="Slide Number Placeholder 4"/>
+          <p:cNvSpPr>
+            <a:spLocks noGrp="1"/>
+          </p:cNvSpPr>
+          <p:nvPr>
+            <p:ph type="sldNum" sz="quarter" idx="12"/>
+          </p:nvPr>
+        </p:nvSpPr>
+        <p:spPr/>
+        <p:txBody>
+          <a:bodyPr/>
+          <a:lstStyle/>
+          <a:p>
+            <a:fld id="{D57F1E4F-1CFF-5643-939E-217C01CDF565}" type="slidenum">
+              <a:rPr lang="en-US" smtClean="0"/>
+              <a:pPr/>
+              <a:t>11</a:t>
+            </a:fld>
+            <a:endParaRPr lang="en-US" dirty="0"/>
+          </a:p>
+        </p:txBody>
+      </p:sp>
+      <p:pic>
+        <p:nvPicPr>
+          <p:cNvPr id="7" name="Picture 6"/>
+          <p:cNvPicPr>
+            <a:picLocks noChangeAspect="1"/>
+          </p:cNvPicPr>
+          <p:nvPr/>
+        </p:nvPicPr>
+        <p:blipFill>
+          <a:blip r:embed="rId2">
+            <a:extLst>
+              <a:ext uri="{28A0092B-C50C-407E-A947-70E740481C1C}">
+                <a14:useLocalDpi xmlns:a14="http://schemas.microsoft.com/office/drawing/2010/main" val="0"/>
+              </a:ext>
+            </a:extLst>
+          </a:blip>
+          <a:stretch>
+            <a:fillRect/>
+          </a:stretch>
+        </p:blipFill>
+        <p:spPr>
+          <a:xfrm>
+            <a:off x="5665675" y="84214"/>
+            <a:ext cx="2974472" cy="2974472"/>
+          </a:xfrm>
+          <a:prstGeom prst="rect">
+            <a:avLst/>
+          </a:prstGeom>
+        </p:spPr>
+      </p:pic>
+      <p:pic>
+        <p:nvPicPr>
+          <p:cNvPr id="8" name="Picture 7"/>
+          <p:cNvPicPr>
+            <a:picLocks noChangeAspect="1"/>
+          </p:cNvPicPr>
+          <p:nvPr/>
+        </p:nvPicPr>
+        <p:blipFill rotWithShape="1">
+          <a:blip r:embed="rId3">
+            <a:extLst>
+              <a:ext uri="{28A0092B-C50C-407E-A947-70E740481C1C}">
+                <a14:useLocalDpi xmlns:a14="http://schemas.microsoft.com/office/drawing/2010/main" val="0"/>
+              </a:ext>
+            </a:extLst>
+          </a:blip>
+          <a:srcRect t="5935" b="16465"/>
+          <a:stretch/>
+        </p:blipFill>
+        <p:spPr>
+          <a:xfrm>
+            <a:off x="4350651" y="2871949"/>
+            <a:ext cx="5248589" cy="3054699"/>
+          </a:xfrm>
+          <a:prstGeom prst="rect">
+            <a:avLst/>
+          </a:prstGeom>
+        </p:spPr>
+      </p:pic>
+    </p:spTree>
+    <p:extLst>
+      <p:ext uri="{BB962C8B-B14F-4D97-AF65-F5344CB8AC3E}">
+        <p14:creationId xmlns:p14="http://schemas.microsoft.com/office/powerpoint/2010/main" val="723456919"/>
+      </p:ext>
+    </p:extLst>
+  </p:cSld>
+  <p:clrMapOvr>
+    <a:masterClrMapping/>
+  </p:clrMapOvr>
+  <p:timing>
+    <p:tnLst>
+      <p:par>
+        <p:cTn id="1" dur="indefinite" restart="never" nodeType="tmRoot"/>
+      </p:par>
+    </p:tnLst>
+  </p:timing>
+</p:sld>
+</file>
+
+<file path=ppt/slides/slide12.xml><?xml version="1.0" encoding="utf-8"?>
+<p:sld xmlns:a="http://schemas.openxmlformats.org/drawingml/2006/main" xmlns:r="http://schemas.openxmlformats.org/officeDocument/2006/relationships" xmlns:p="http://schemas.openxmlformats.org/presentationml/2006/main">
+  <p:cSld>
+    <p:spTree>
+      <p:nvGrpSpPr>
+        <p:cNvPr id="1" name=""/>
+        <p:cNvGrpSpPr/>
+        <p:nvPr/>
+      </p:nvGrpSpPr>
+      <p:grpSpPr>
+        <a:xfrm>
+          <a:off x="0" y="0"/>
+          <a:ext cx="0" cy="0"/>
+          <a:chOff x="0" y="0"/>
+          <a:chExt cx="0" cy="0"/>
+        </a:xfrm>
+      </p:grpSpPr>
+      <p:sp>
+        <p:nvSpPr>
+          <p:cNvPr id="2" name="Title 1"/>
+          <p:cNvSpPr>
+            <a:spLocks noGrp="1"/>
+          </p:cNvSpPr>
+          <p:nvPr>
+            <p:ph type="title"/>
+          </p:nvPr>
+        </p:nvSpPr>
+        <p:spPr/>
+        <p:txBody>
+          <a:bodyPr/>
+          <a:lstStyle/>
+          <a:p>
+            <a:r>
+              <a:rPr lang="fr-FR" dirty="0" err="1"/>
+              <a:t>Xen</a:t>
+            </a:r>
+            <a:r>
+              <a:rPr lang="fr-FR" dirty="0"/>
+              <a:t> Orchestra : Architecture</a:t>
+            </a:r>
+          </a:p>
+        </p:txBody>
+      </p:sp>
+      <p:sp>
+        <p:nvSpPr>
+          <p:cNvPr id="3" name="Text Placeholder 2"/>
+          <p:cNvSpPr>
+            <a:spLocks noGrp="1"/>
+          </p:cNvSpPr>
+          <p:nvPr>
+            <p:ph type="body" idx="1"/>
+          </p:nvPr>
+        </p:nvSpPr>
+        <p:spPr/>
+        <p:txBody>
+          <a:bodyPr/>
+          <a:lstStyle/>
+          <a:p>
+            <a:endParaRPr lang="fr-FR"/>
+          </a:p>
+        </p:txBody>
+      </p:sp>
+      <p:sp>
+        <p:nvSpPr>
+          <p:cNvPr id="4" name="Content Placeholder 3"/>
+          <p:cNvSpPr>
+            <a:spLocks noGrp="1"/>
+          </p:cNvSpPr>
+          <p:nvPr>
+            <p:ph sz="half" idx="2"/>
+          </p:nvPr>
+        </p:nvSpPr>
+        <p:spPr/>
+        <p:txBody>
+          <a:bodyPr/>
+          <a:lstStyle/>
+          <a:p>
+            <a:r>
+              <a:rPr lang="fr-FR" dirty="0" err="1" smtClean="0"/>
+              <a:t>Xo</a:t>
+            </a:r>
+            <a:r>
+              <a:rPr lang="fr-FR" dirty="0" smtClean="0"/>
+              <a:t>-server</a:t>
+            </a:r>
+            <a:endParaRPr lang="fr-FR" dirty="0"/>
+          </a:p>
+        </p:txBody>
+      </p:sp>
+      <p:sp>
+        <p:nvSpPr>
+          <p:cNvPr id="5" name="Text Placeholder 4"/>
+          <p:cNvSpPr>
+            <a:spLocks noGrp="1"/>
+          </p:cNvSpPr>
+          <p:nvPr>
+            <p:ph type="body" sz="quarter" idx="3"/>
+          </p:nvPr>
+        </p:nvSpPr>
+        <p:spPr/>
+        <p:txBody>
+          <a:bodyPr/>
+          <a:lstStyle/>
+          <a:p>
+            <a:endParaRPr lang="fr-FR"/>
+          </a:p>
+        </p:txBody>
+      </p:sp>
+      <p:sp>
+        <p:nvSpPr>
+          <p:cNvPr id="6" name="Content Placeholder 5"/>
+          <p:cNvSpPr>
+            <a:spLocks noGrp="1"/>
+          </p:cNvSpPr>
+          <p:nvPr>
+            <p:ph sz="quarter" idx="4"/>
+          </p:nvPr>
+        </p:nvSpPr>
+        <p:spPr/>
+        <p:txBody>
+          <a:bodyPr/>
+          <a:lstStyle/>
+          <a:p>
+            <a:r>
+              <a:rPr lang="fr-FR" dirty="0" err="1" smtClean="0"/>
+              <a:t>Xo</a:t>
+            </a:r>
+            <a:r>
+              <a:rPr lang="fr-FR" dirty="0" smtClean="0"/>
+              <a:t>-web</a:t>
+            </a:r>
+            <a:endParaRPr lang="fr-FR" dirty="0"/>
+          </a:p>
+        </p:txBody>
+      </p:sp>
+      <p:sp>
+        <p:nvSpPr>
+          <p:cNvPr id="7" name="Footer Placeholder 6"/>
+          <p:cNvSpPr>
+            <a:spLocks noGrp="1"/>
+          </p:cNvSpPr>
+          <p:nvPr>
+            <p:ph type="ftr" sz="quarter" idx="11"/>
+          </p:nvPr>
+        </p:nvSpPr>
+        <p:spPr/>
+        <p:txBody>
+          <a:bodyPr/>
+          <a:lstStyle/>
+          <a:p>
+            <a:r>
+              <a:rPr lang="en-US" smtClean="0"/>
+              <a:t>Bois Cédric - Master WIC</a:t>
+            </a:r>
+            <a:endParaRPr lang="en-US" dirty="0"/>
+          </a:p>
+        </p:txBody>
+      </p:sp>
+      <p:sp>
+        <p:nvSpPr>
+          <p:cNvPr id="8" name="Slide Number Placeholder 7"/>
+          <p:cNvSpPr>
+            <a:spLocks noGrp="1"/>
+          </p:cNvSpPr>
+          <p:nvPr>
+            <p:ph type="sldNum" sz="quarter" idx="12"/>
+          </p:nvPr>
+        </p:nvSpPr>
+        <p:spPr/>
+        <p:txBody>
+          <a:bodyPr/>
+          <a:lstStyle/>
+          <a:p>
+            <a:fld id="{D57F1E4F-1CFF-5643-939E-217C01CDF565}" type="slidenum">
+              <a:rPr lang="en-US" smtClean="0"/>
+              <a:pPr/>
+              <a:t>12</a:t>
+            </a:fld>
+            <a:endParaRPr lang="en-US" dirty="0"/>
+          </a:p>
+        </p:txBody>
+      </p:sp>
+      <p:pic>
+        <p:nvPicPr>
+          <p:cNvPr id="9" name="Picture 8"/>
+          <p:cNvPicPr/>
+          <p:nvPr/>
+        </p:nvPicPr>
+        <p:blipFill>
+          <a:blip r:embed="rId2" cstate="print">
+            <a:extLst>
+              <a:ext uri="{28A0092B-C50C-407E-A947-70E740481C1C}">
+                <a14:useLocalDpi xmlns:a14="http://schemas.microsoft.com/office/drawing/2010/main" val="0"/>
+              </a:ext>
+            </a:extLst>
+          </a:blip>
+          <a:stretch>
+            <a:fillRect/>
+          </a:stretch>
+        </p:blipFill>
+        <p:spPr>
+          <a:xfrm>
+            <a:off x="7908410" y="989220"/>
+            <a:ext cx="1365591" cy="5052142"/>
+          </a:xfrm>
+          <a:prstGeom prst="rect">
+            <a:avLst/>
+          </a:prstGeom>
+        </p:spPr>
+      </p:pic>
+      <p:pic>
+        <p:nvPicPr>
+          <p:cNvPr id="10" name="Picture 9"/>
+          <p:cNvPicPr/>
+          <p:nvPr/>
+        </p:nvPicPr>
+        <p:blipFill rotWithShape="1">
+          <a:blip r:embed="rId3" cstate="print">
+            <a:extLst>
+              <a:ext uri="{28A0092B-C50C-407E-A947-70E740481C1C}">
+                <a14:useLocalDpi xmlns:a14="http://schemas.microsoft.com/office/drawing/2010/main" val="0"/>
+              </a:ext>
+            </a:extLst>
+          </a:blip>
+          <a:srcRect l="1" r="31805" b="64758"/>
+          <a:stretch/>
+        </p:blipFill>
+        <p:spPr bwMode="auto">
+          <a:xfrm>
+            <a:off x="3076495" y="2160983"/>
+            <a:ext cx="2011887" cy="3412854"/>
+          </a:xfrm>
+          <a:prstGeom prst="rect">
+            <a:avLst/>
+          </a:prstGeom>
+          <a:ln>
+            <a:noFill/>
+          </a:ln>
+          <a:extLst>
+            <a:ext uri="{53640926-AAD7-44D8-BBD7-CCE9431645EC}">
+              <a14:shadowObscured xmlns:a14="http://schemas.microsoft.com/office/drawing/2010/main"/>
+            </a:ext>
+          </a:extLst>
+        </p:spPr>
+      </p:pic>
+    </p:spTree>
+    <p:extLst>
+      <p:ext uri="{BB962C8B-B14F-4D97-AF65-F5344CB8AC3E}">
+        <p14:creationId xmlns:p14="http://schemas.microsoft.com/office/powerpoint/2010/main" val="1898645450"/>
+      </p:ext>
+    </p:extLst>
+  </p:cSld>
+  <p:clrMapOvr>
+    <a:masterClrMapping/>
+  </p:clrMapOvr>
+  <p:timing>
+    <p:tnLst>
+      <p:par>
+        <p:cTn id="1" dur="indefinite" restart="never" nodeType="tmRoot"/>
+      </p:par>
+    </p:tnLst>
+  </p:timing>
+</p:sld>
+</file>
+
+<file path=ppt/slides/slide13.xml><?xml version="1.0" encoding="utf-8"?>
+<p:sld xmlns:a="http://schemas.openxmlformats.org/drawingml/2006/main" xmlns:r="http://schemas.openxmlformats.org/officeDocument/2006/relationships" xmlns:p="http://schemas.openxmlformats.org/presentationml/2006/main">
+  <p:cSld>
+    <p:spTree>
+      <p:nvGrpSpPr>
+        <p:cNvPr id="1" name=""/>
+        <p:cNvGrpSpPr/>
+        <p:nvPr/>
+      </p:nvGrpSpPr>
+      <p:grpSpPr>
+        <a:xfrm>
+          <a:off x="0" y="0"/>
+          <a:ext cx="0" cy="0"/>
+          <a:chOff x="0" y="0"/>
+          <a:chExt cx="0" cy="0"/>
+        </a:xfrm>
+      </p:grpSpPr>
+      <p:sp>
+        <p:nvSpPr>
+          <p:cNvPr id="2" name="Title 1"/>
+          <p:cNvSpPr>
+            <a:spLocks noGrp="1"/>
+          </p:cNvSpPr>
+          <p:nvPr>
+            <p:ph type="title"/>
+          </p:nvPr>
+        </p:nvSpPr>
+        <p:spPr/>
+        <p:txBody>
+          <a:bodyPr/>
+          <a:lstStyle/>
+          <a:p>
+            <a:r>
+              <a:rPr lang="fr-FR" dirty="0" err="1" smtClean="0"/>
+              <a:t>VmAppliance</a:t>
+            </a:r>
+            <a:r>
+              <a:rPr lang="fr-FR" dirty="0" smtClean="0"/>
+              <a:t> : Objectifs</a:t>
+            </a:r>
+            <a:endParaRPr lang="fr-FR" dirty="0"/>
+          </a:p>
+        </p:txBody>
+      </p:sp>
+      <p:sp>
+        <p:nvSpPr>
+          <p:cNvPr id="3" name="Content Placeholder 2"/>
+          <p:cNvSpPr>
+            <a:spLocks noGrp="1"/>
+          </p:cNvSpPr>
+          <p:nvPr>
+            <p:ph idx="1"/>
+          </p:nvPr>
+        </p:nvSpPr>
+        <p:spPr/>
+        <p:txBody>
+          <a:bodyPr/>
+          <a:lstStyle/>
+          <a:p>
+            <a:r>
+              <a:rPr lang="fr-FR" dirty="0" err="1" smtClean="0"/>
+              <a:t>Xo</a:t>
+            </a:r>
+            <a:r>
+              <a:rPr lang="fr-FR" dirty="0" smtClean="0"/>
+              <a:t>-server</a:t>
+            </a:r>
+            <a:endParaRPr lang="fr-FR" dirty="0"/>
+          </a:p>
+        </p:txBody>
+      </p:sp>
+      <p:sp>
+        <p:nvSpPr>
+          <p:cNvPr id="4" name="Footer Placeholder 3"/>
+          <p:cNvSpPr>
+            <a:spLocks noGrp="1"/>
+          </p:cNvSpPr>
+          <p:nvPr>
+            <p:ph type="ftr" sz="quarter" idx="11"/>
+          </p:nvPr>
+        </p:nvSpPr>
+        <p:spPr/>
+        <p:txBody>
+          <a:bodyPr/>
+          <a:lstStyle/>
+          <a:p>
+            <a:r>
+              <a:rPr lang="en-US" smtClean="0"/>
+              <a:t>Bois Cédric - Master WIC</a:t>
+            </a:r>
+            <a:endParaRPr lang="en-US" dirty="0"/>
+          </a:p>
+        </p:txBody>
+      </p:sp>
+      <p:sp>
+        <p:nvSpPr>
+          <p:cNvPr id="5" name="Slide Number Placeholder 4"/>
+          <p:cNvSpPr>
+            <a:spLocks noGrp="1"/>
+          </p:cNvSpPr>
+          <p:nvPr>
+            <p:ph type="sldNum" sz="quarter" idx="12"/>
+          </p:nvPr>
+        </p:nvSpPr>
+        <p:spPr/>
+        <p:txBody>
+          <a:bodyPr/>
+          <a:lstStyle/>
+          <a:p>
+            <a:fld id="{D57F1E4F-1CFF-5643-939E-217C01CDF565}" type="slidenum">
+              <a:rPr lang="en-US" smtClean="0"/>
+              <a:pPr/>
+              <a:t>13</a:t>
+            </a:fld>
+            <a:endParaRPr lang="en-US" dirty="0"/>
+          </a:p>
+        </p:txBody>
+      </p:sp>
+    </p:spTree>
+    <p:extLst>
+      <p:ext uri="{BB962C8B-B14F-4D97-AF65-F5344CB8AC3E}">
+        <p14:creationId xmlns:p14="http://schemas.microsoft.com/office/powerpoint/2010/main" val="3006790768"/>
       </p:ext>
     </p:extLst>
   </p:cSld>
@@ -6650,6 +7946,83 @@
               <a:rPr lang="fr-FR" dirty="0" smtClean="0"/>
               <a:t>Utilise différents outils de gestion de projet</a:t>
             </a:r>
+          </a:p>
+        </p:txBody>
+      </p:sp>
+      <p:pic>
+        <p:nvPicPr>
+          <p:cNvPr id="4" name="Picture 3"/>
+          <p:cNvPicPr>
+            <a:picLocks noChangeAspect="1"/>
+          </p:cNvPicPr>
+          <p:nvPr/>
+        </p:nvPicPr>
+        <p:blipFill>
+          <a:blip r:embed="rId3">
+            <a:extLst>
+              <a:ext uri="{28A0092B-C50C-407E-A947-70E740481C1C}">
+                <a14:useLocalDpi xmlns:a14="http://schemas.microsoft.com/office/drawing/2010/main" val="0"/>
+              </a:ext>
+            </a:extLst>
+          </a:blip>
+          <a:stretch>
+            <a:fillRect/>
+          </a:stretch>
+        </p:blipFill>
+        <p:spPr>
+          <a:xfrm>
+            <a:off x="7087267" y="2701163"/>
+            <a:ext cx="4222013" cy="1399812"/>
+          </a:xfrm>
+          <a:prstGeom prst="rect">
+            <a:avLst/>
+          </a:prstGeom>
+        </p:spPr>
+      </p:pic>
+      <p:sp>
+        <p:nvSpPr>
+          <p:cNvPr id="5" name="Footer Placeholder 4"/>
+          <p:cNvSpPr>
+            <a:spLocks noGrp="1"/>
+          </p:cNvSpPr>
+          <p:nvPr>
+            <p:ph type="ftr" sz="quarter" idx="11"/>
+          </p:nvPr>
+        </p:nvSpPr>
+        <p:spPr/>
+        <p:txBody>
+          <a:bodyPr/>
+          <a:lstStyle/>
+          <a:p>
+            <a:r>
+              <a:rPr lang="en-US" smtClean="0"/>
+              <a:t>Bois Cédric - Master WIC</a:t>
+            </a:r>
+            <a:endParaRPr lang="en-US" dirty="0"/>
+          </a:p>
+        </p:txBody>
+      </p:sp>
+      <p:sp>
+        <p:nvSpPr>
+          <p:cNvPr id="6" name="Slide Number Placeholder 5"/>
+          <p:cNvSpPr>
+            <a:spLocks noGrp="1"/>
+          </p:cNvSpPr>
+          <p:nvPr>
+            <p:ph type="sldNum" sz="quarter" idx="12"/>
+          </p:nvPr>
+        </p:nvSpPr>
+        <p:spPr/>
+        <p:txBody>
+          <a:bodyPr/>
+          <a:lstStyle/>
+          <a:p>
+            <a:fld id="{D57F1E4F-1CFF-5643-939E-217C01CDF565}" type="slidenum">
+              <a:rPr lang="en-US" smtClean="0"/>
+              <a:pPr/>
+              <a:t>2</a:t>
+            </a:fld>
+            <a:endParaRPr lang="en-US" dirty="0"/>
           </a:p>
         </p:txBody>
       </p:sp>
@@ -6762,6 +8135,53 @@
           </a:ln>
         </p:spPr>
       </p:pic>
+      <p:sp>
+        <p:nvSpPr>
+          <p:cNvPr id="5" name="Footer Placeholder 4"/>
+          <p:cNvSpPr>
+            <a:spLocks noGrp="1"/>
+          </p:cNvSpPr>
+          <p:nvPr>
+            <p:ph type="ftr" sz="quarter" idx="11"/>
+          </p:nvPr>
+        </p:nvSpPr>
+        <p:spPr/>
+        <p:txBody>
+          <a:bodyPr/>
+          <a:lstStyle/>
+          <a:p>
+            <a:r>
+              <a:rPr lang="en-US" smtClean="0"/>
+              <a:t>Bois Cédric - Master WIC</a:t>
+            </a:r>
+            <a:endParaRPr lang="en-US" dirty="0"/>
+          </a:p>
+        </p:txBody>
+      </p:sp>
+      <p:sp>
+        <p:nvSpPr>
+          <p:cNvPr id="6" name="Slide Number Placeholder 5"/>
+          <p:cNvSpPr>
+            <a:spLocks noGrp="1"/>
+          </p:cNvSpPr>
+          <p:nvPr>
+            <p:ph type="sldNum" sz="quarter" idx="12"/>
+          </p:nvPr>
+        </p:nvSpPr>
+        <p:spPr/>
+        <p:txBody>
+          <a:bodyPr/>
+          <a:lstStyle/>
+          <a:p>
+            <a:fld id="{D57F1E4F-1CFF-5643-939E-217C01CDF565}" type="slidenum">
+              <a:rPr lang="en-US" smtClean="0"/>
+              <a:pPr/>
+              <a:t>3</a:t>
+            </a:fld>
+            <a:endParaRPr lang="en-US" dirty="0"/>
+          </a:p>
+        </p:txBody>
+      </p:sp>
     </p:spTree>
     <p:extLst>
       <p:ext uri="{BB962C8B-B14F-4D97-AF65-F5344CB8AC3E}">
@@ -6772,6 +8192,13 @@
   <p:clrMapOvr>
     <a:masterClrMapping/>
   </p:clrMapOvr>
+  <p:timing>
+    <p:tnLst>
+      <p:par>
+        <p:cTn id="1" dur="indefinite" restart="never" nodeType="tmRoot"/>
+      </p:par>
+    </p:tnLst>
+  </p:timing>
 </p:sld>
 </file>
 
@@ -6839,27 +8266,8 @@
             </a:pPr>
             <a:r>
               <a:rPr lang="fr-FR" dirty="0" smtClean="0"/>
-              <a:t>Programmation par composants </a:t>
-            </a:r>
-            <a:r>
-              <a:rPr lang="fr-FR" dirty="0" smtClean="0"/>
-              <a:t>:</a:t>
-            </a:r>
-          </a:p>
-          <a:p>
-            <a:r>
-              <a:rPr lang="fr-FR" dirty="0" err="1" smtClean="0"/>
-              <a:t>Stateless</a:t>
-            </a:r>
-            <a:r>
-              <a:rPr lang="fr-FR" dirty="0" smtClean="0"/>
-              <a:t>, </a:t>
-            </a:r>
-            <a:r>
-              <a:rPr lang="fr-FR" dirty="0" err="1" smtClean="0"/>
-              <a:t>stateful</a:t>
-            </a:r>
-            <a:endParaRPr lang="fr-FR" dirty="0" smtClean="0"/>
+              <a:t>Programmation par composants :</a:t>
+            </a:r>
           </a:p>
           <a:p>
             <a:r>
@@ -6915,8 +8323,8 @@
         </p:blipFill>
         <p:spPr bwMode="auto">
           <a:xfrm>
-            <a:off x="5758813" y="3731881"/>
-            <a:ext cx="3515189" cy="369094"/>
+            <a:off x="6046839" y="5737841"/>
+            <a:ext cx="2890683" cy="303521"/>
           </a:xfrm>
           <a:prstGeom prst="rect">
             <a:avLst/>
@@ -6930,6 +8338,77 @@
           </a:ln>
         </p:spPr>
       </p:pic>
+      <p:pic>
+        <p:nvPicPr>
+          <p:cNvPr id="5" name="Picture 4"/>
+          <p:cNvPicPr>
+            <a:picLocks noChangeAspect="1"/>
+          </p:cNvPicPr>
+          <p:nvPr/>
+        </p:nvPicPr>
+        <p:blipFill>
+          <a:blip r:embed="rId4"/>
+          <a:stretch>
+            <a:fillRect/>
+          </a:stretch>
+        </p:blipFill>
+        <p:spPr>
+          <a:xfrm>
+            <a:off x="4596582" y="2744350"/>
+            <a:ext cx="6710372" cy="2713250"/>
+          </a:xfrm>
+          <a:prstGeom prst="rect">
+            <a:avLst/>
+          </a:prstGeom>
+        </p:spPr>
+      </p:pic>
+      <p:sp>
+        <p:nvSpPr>
+          <p:cNvPr id="6" name="Footer Placeholder 5"/>
+          <p:cNvSpPr>
+            <a:spLocks noGrp="1"/>
+          </p:cNvSpPr>
+          <p:nvPr>
+            <p:ph type="ftr" sz="quarter" idx="11"/>
+          </p:nvPr>
+        </p:nvSpPr>
+        <p:spPr/>
+        <p:txBody>
+          <a:bodyPr/>
+          <a:lstStyle/>
+          <a:p>
+            <a:r>
+              <a:rPr lang="en-US" smtClean="0"/>
+              <a:t>Bois Cédric - Master WIC</a:t>
+            </a:r>
+            <a:endParaRPr lang="en-US" dirty="0"/>
+          </a:p>
+        </p:txBody>
+      </p:sp>
+      <p:sp>
+        <p:nvSpPr>
+          <p:cNvPr id="7" name="Slide Number Placeholder 6"/>
+          <p:cNvSpPr>
+            <a:spLocks noGrp="1"/>
+          </p:cNvSpPr>
+          <p:nvPr>
+            <p:ph type="sldNum" sz="quarter" idx="12"/>
+          </p:nvPr>
+        </p:nvSpPr>
+        <p:spPr/>
+        <p:txBody>
+          <a:bodyPr/>
+          <a:lstStyle/>
+          <a:p>
+            <a:fld id="{D57F1E4F-1CFF-5643-939E-217C01CDF565}" type="slidenum">
+              <a:rPr lang="en-US" smtClean="0"/>
+              <a:pPr/>
+              <a:t>4</a:t>
+            </a:fld>
+            <a:endParaRPr lang="en-US" dirty="0"/>
+          </a:p>
+        </p:txBody>
+      </p:sp>
     </p:spTree>
     <p:extLst>
       <p:ext uri="{BB962C8B-B14F-4D97-AF65-F5344CB8AC3E}">
@@ -7008,6 +8487,21 @@
           <a:bodyPr/>
           <a:lstStyle/>
           <a:p>
+            <a:r>
+              <a:rPr lang="fr-FR" dirty="0" err="1"/>
+              <a:t>Stateless</a:t>
+            </a:r>
+            <a:r>
+              <a:rPr lang="fr-FR" dirty="0"/>
+              <a:t>, </a:t>
+            </a:r>
+            <a:r>
+              <a:rPr lang="fr-FR" dirty="0" err="1"/>
+              <a:t>stateful</a:t>
+            </a:r>
+            <a:endParaRPr lang="fr-FR" dirty="0"/>
+          </a:p>
+          <a:p>
             <a:endParaRPr lang="fr-FR" dirty="0"/>
           </a:p>
         </p:txBody>
@@ -7019,7 +8513,7 @@
           <p:nvPr/>
         </p:nvPicPr>
         <p:blipFill>
-          <a:blip r:embed="rId2" cstate="print"/>
+          <a:blip r:embed="rId3" cstate="print"/>
           <a:srcRect l="15318" t="15278" r="59029" b="76576"/>
           <a:stretch>
             <a:fillRect/>
@@ -7049,7 +8543,7 @@
           <p:nvPr/>
         </p:nvPicPr>
         <p:blipFill rotWithShape="1">
-          <a:blip r:embed="rId3" cstate="print"/>
+          <a:blip r:embed="rId4" cstate="print"/>
           <a:srcRect l="17486" t="15335" r="41645" b="32231"/>
           <a:stretch/>
         </p:blipFill>
@@ -7072,6 +8566,53 @@
           </a:extLst>
         </p:spPr>
       </p:pic>
+      <p:sp>
+        <p:nvSpPr>
+          <p:cNvPr id="6" name="Footer Placeholder 5"/>
+          <p:cNvSpPr>
+            <a:spLocks noGrp="1"/>
+          </p:cNvSpPr>
+          <p:nvPr>
+            <p:ph type="ftr" sz="quarter" idx="11"/>
+          </p:nvPr>
+        </p:nvSpPr>
+        <p:spPr/>
+        <p:txBody>
+          <a:bodyPr/>
+          <a:lstStyle/>
+          <a:p>
+            <a:r>
+              <a:rPr lang="en-US" smtClean="0"/>
+              <a:t>Bois Cédric - Master WIC</a:t>
+            </a:r>
+            <a:endParaRPr lang="en-US" dirty="0"/>
+          </a:p>
+        </p:txBody>
+      </p:sp>
+      <p:sp>
+        <p:nvSpPr>
+          <p:cNvPr id="7" name="Slide Number Placeholder 6"/>
+          <p:cNvSpPr>
+            <a:spLocks noGrp="1"/>
+          </p:cNvSpPr>
+          <p:nvPr>
+            <p:ph type="sldNum" sz="quarter" idx="12"/>
+          </p:nvPr>
+        </p:nvSpPr>
+        <p:spPr/>
+        <p:txBody>
+          <a:bodyPr/>
+          <a:lstStyle/>
+          <a:p>
+            <a:fld id="{D57F1E4F-1CFF-5643-939E-217C01CDF565}" type="slidenum">
+              <a:rPr lang="en-US" smtClean="0"/>
+              <a:pPr/>
+              <a:t>5</a:t>
+            </a:fld>
+            <a:endParaRPr lang="en-US" dirty="0"/>
+          </a:p>
+        </p:txBody>
+      </p:sp>
     </p:spTree>
     <p:extLst>
       <p:ext uri="{BB962C8B-B14F-4D97-AF65-F5344CB8AC3E}">
@@ -7082,6 +8623,13 @@
   <p:clrMapOvr>
     <a:masterClrMapping/>
   </p:clrMapOvr>
+  <p:timing>
+    <p:tnLst>
+      <p:par>
+        <p:cTn id="1" dur="indefinite" restart="never" nodeType="tmRoot"/>
+      </p:par>
+    </p:tnLst>
+  </p:timing>
 </p:sld>
 </file>
 
@@ -7174,6 +8722,77 @@
               <a:t>) =&gt;  traitement =&gt; </a:t>
             </a:r>
             <a:endParaRPr lang="fr-FR" dirty="0"/>
+          </a:p>
+        </p:txBody>
+      </p:sp>
+      <p:pic>
+        <p:nvPicPr>
+          <p:cNvPr id="4" name="Picture 3"/>
+          <p:cNvPicPr>
+            <a:picLocks noChangeAspect="1"/>
+          </p:cNvPicPr>
+          <p:nvPr/>
+        </p:nvPicPr>
+        <p:blipFill>
+          <a:blip r:embed="rId3"/>
+          <a:stretch>
+            <a:fillRect/>
+          </a:stretch>
+        </p:blipFill>
+        <p:spPr>
+          <a:xfrm>
+            <a:off x="6390968" y="2160590"/>
+            <a:ext cx="3113307" cy="365412"/>
+          </a:xfrm>
+          <a:prstGeom prst="rect">
+            <a:avLst/>
+          </a:prstGeom>
+        </p:spPr>
+      </p:pic>
+      <p:sp>
+        <p:nvSpPr>
+          <p:cNvPr id="7" name="Footer Placeholder 6"/>
+          <p:cNvSpPr>
+            <a:spLocks noGrp="1"/>
+          </p:cNvSpPr>
+          <p:nvPr>
+            <p:ph type="ftr" sz="quarter" idx="11"/>
+          </p:nvPr>
+        </p:nvSpPr>
+        <p:spPr/>
+        <p:txBody>
+          <a:bodyPr/>
+          <a:lstStyle/>
+          <a:p>
+            <a:r>
+              <a:rPr lang="en-US" smtClean="0"/>
+              <a:t>Bois Cédric - Master WIC</a:t>
+            </a:r>
+            <a:endParaRPr lang="en-US" dirty="0"/>
+          </a:p>
+        </p:txBody>
+      </p:sp>
+      <p:sp>
+        <p:nvSpPr>
+          <p:cNvPr id="8" name="Slide Number Placeholder 7"/>
+          <p:cNvSpPr>
+            <a:spLocks noGrp="1"/>
+          </p:cNvSpPr>
+          <p:nvPr>
+            <p:ph type="sldNum" sz="quarter" idx="12"/>
+          </p:nvPr>
+        </p:nvSpPr>
+        <p:spPr/>
+        <p:txBody>
+          <a:bodyPr/>
+          <a:lstStyle/>
+          <a:p>
+            <a:fld id="{D57F1E4F-1CFF-5643-939E-217C01CDF565}" type="slidenum">
+              <a:rPr lang="en-US" smtClean="0"/>
+              <a:pPr/>
+              <a:t>6</a:t>
+            </a:fld>
+            <a:endParaRPr lang="en-US" dirty="0"/>
           </a:p>
         </p:txBody>
       </p:sp>
@@ -7216,7 +8835,7 @@
       </p:grpSpPr>
       <p:sp>
         <p:nvSpPr>
-          <p:cNvPr id="2" name="Titre 1"/>
+          <p:cNvPr id="2" name="Title 1"/>
           <p:cNvSpPr>
             <a:spLocks noGrp="1"/>
           </p:cNvSpPr>
@@ -7229,13 +8848,21 @@
           <a:bodyPr/>
           <a:lstStyle/>
           <a:p>
-            <a:endParaRPr lang="fr-FR"/>
-          </a:p>
-        </p:txBody>
-      </p:sp>
-      <p:sp>
-        <p:nvSpPr>
-          <p:cNvPr id="3" name="Espace réservé du contenu 2"/>
+            <a:r>
+              <a:rPr lang="fr-FR" dirty="0" err="1" smtClean="0"/>
+              <a:t>withState</a:t>
+            </a:r>
+            <a:r>
+              <a:rPr lang="fr-FR" dirty="0" smtClean="0"/>
+              <a:t> : objectifs</a:t>
+            </a:r>
+            <a:endParaRPr lang="fr-FR" dirty="0"/>
+          </a:p>
+        </p:txBody>
+      </p:sp>
+      <p:sp>
+        <p:nvSpPr>
+          <p:cNvPr id="3" name="Content Placeholder 2"/>
           <p:cNvSpPr>
             <a:spLocks noGrp="1"/>
           </p:cNvSpPr>
@@ -7243,25 +8870,411 @@
             <p:ph idx="1"/>
           </p:nvPr>
         </p:nvSpPr>
-        <p:spPr/>
-        <p:txBody>
-          <a:bodyPr/>
-          <a:lstStyle/>
-          <a:p>
-            <a:endParaRPr lang="fr-FR"/>
+        <p:spPr>
+          <a:xfrm>
+            <a:off x="693702" y="1179347"/>
+            <a:ext cx="8596668" cy="4281388"/>
+          </a:xfrm>
+        </p:spPr>
+        <p:txBody>
+          <a:bodyPr/>
+          <a:lstStyle/>
+          <a:p>
+            <a:pPr lvl="0"/>
+            <a:r>
+              <a:rPr lang="fr-FR" sz="1600" dirty="0" smtClean="0"/>
+              <a:t>Déclaration d’un state avec un nombre de niveau non défini</a:t>
+            </a:r>
+          </a:p>
+          <a:p>
+            <a:pPr lvl="0"/>
+            <a:r>
+              <a:rPr lang="fr-FR" sz="1600" dirty="0" smtClean="0"/>
+              <a:t>Une action renvoie une valeur de mise à jour de son sous-state</a:t>
+            </a:r>
+          </a:p>
+          <a:p>
+            <a:pPr lvl="0"/>
+            <a:r>
+              <a:rPr lang="fr-FR" sz="1600" dirty="0" smtClean="0"/>
+              <a:t>Décoration d’un </a:t>
+            </a:r>
+            <a:r>
+              <a:rPr lang="fr-FR" sz="1600" dirty="0"/>
+              <a:t>composant </a:t>
+            </a:r>
+            <a:r>
+              <a:rPr lang="fr-FR" sz="1600" dirty="0" err="1" smtClean="0"/>
+              <a:t>stateful</a:t>
+            </a:r>
+            <a:r>
+              <a:rPr lang="fr-FR" sz="1600" dirty="0" smtClean="0"/>
+              <a:t> ou </a:t>
+            </a:r>
+            <a:r>
+              <a:rPr lang="fr-FR" sz="1600" dirty="0" err="1" smtClean="0"/>
+              <a:t>stateless</a:t>
+            </a:r>
+            <a:r>
+              <a:rPr lang="fr-FR" sz="1600" dirty="0"/>
+              <a:t>.</a:t>
+            </a:r>
+          </a:p>
+          <a:p>
+            <a:pPr lvl="0"/>
+            <a:r>
+              <a:rPr lang="fr-FR" sz="1600" dirty="0"/>
+              <a:t>Utiliser une fonction pour initialiser la valeur d’un sous-state</a:t>
+            </a:r>
+          </a:p>
+          <a:p>
+            <a:pPr lvl="0"/>
+            <a:r>
+              <a:rPr lang="fr-FR" sz="1600" dirty="0"/>
+              <a:t>Remettre la valeur d’un sous-state à sa valeur initiale</a:t>
+            </a:r>
+          </a:p>
+          <a:p>
+            <a:pPr lvl="0"/>
+            <a:r>
+              <a:rPr lang="fr-FR" sz="1600" dirty="0"/>
+              <a:t>Une action peut ne rien retourner</a:t>
+            </a:r>
+          </a:p>
+          <a:p>
+            <a:pPr lvl="0"/>
+            <a:r>
+              <a:rPr lang="fr-FR" sz="1600" dirty="0"/>
+              <a:t>L’initialisation d’une chaine de caractères vide doit pouvoir se faire en lui donnant pour valeur le nom de la fonction qui pourra la modifier grâce à un évènement</a:t>
+            </a:r>
+          </a:p>
+          <a:p>
+            <a:pPr lvl="0"/>
+            <a:r>
+              <a:rPr lang="fr-FR" sz="1600" dirty="0"/>
+              <a:t>Déclencher une erreur si plus d’une valeur </a:t>
+            </a:r>
+            <a:r>
+              <a:rPr lang="fr-FR" sz="1600" dirty="0" smtClean="0"/>
+              <a:t>est déclarée </a:t>
+            </a:r>
+            <a:r>
+              <a:rPr lang="fr-FR" sz="1600" dirty="0"/>
+              <a:t>dans un sous-state</a:t>
+            </a:r>
+          </a:p>
+          <a:p>
+            <a:endParaRPr lang="fr-FR" dirty="0"/>
+          </a:p>
+        </p:txBody>
+      </p:sp>
+      <p:grpSp>
+        <p:nvGrpSpPr>
+          <p:cNvPr id="30" name="Group 29"/>
+          <p:cNvGrpSpPr/>
+          <p:nvPr/>
+        </p:nvGrpSpPr>
+        <p:grpSpPr>
+          <a:xfrm>
+            <a:off x="1227663" y="4349992"/>
+            <a:ext cx="7513746" cy="1453594"/>
+            <a:chOff x="1237900" y="4509818"/>
+            <a:chExt cx="7513746" cy="1453594"/>
+          </a:xfrm>
+        </p:grpSpPr>
+        <p:pic>
+          <p:nvPicPr>
+            <p:cNvPr id="6" name="Picture 5"/>
+            <p:cNvPicPr>
+              <a:picLocks noChangeAspect="1"/>
+            </p:cNvPicPr>
+            <p:nvPr/>
+          </p:nvPicPr>
+          <p:blipFill rotWithShape="1">
+            <a:blip r:embed="rId3"/>
+            <a:srcRect l="1751" t="67336" r="74849" b="22041"/>
+            <a:stretch/>
+          </p:blipFill>
+          <p:spPr>
+            <a:xfrm>
+              <a:off x="1237900" y="4830514"/>
+              <a:ext cx="2143433" cy="838136"/>
+            </a:xfrm>
+            <a:prstGeom prst="rect">
+              <a:avLst/>
+            </a:prstGeom>
+          </p:spPr>
+        </p:pic>
+        <p:pic>
+          <p:nvPicPr>
+            <p:cNvPr id="7" name="Picture 6"/>
+            <p:cNvPicPr>
+              <a:picLocks noChangeAspect="1"/>
+            </p:cNvPicPr>
+            <p:nvPr/>
+          </p:nvPicPr>
+          <p:blipFill>
+            <a:blip r:embed="rId4"/>
+            <a:stretch>
+              <a:fillRect/>
+            </a:stretch>
+          </p:blipFill>
+          <p:spPr>
+            <a:xfrm>
+              <a:off x="5002273" y="4509818"/>
+              <a:ext cx="1073099" cy="320696"/>
+            </a:xfrm>
+            <a:prstGeom prst="rect">
+              <a:avLst/>
+            </a:prstGeom>
+          </p:spPr>
+        </p:pic>
+        <p:pic>
+          <p:nvPicPr>
+            <p:cNvPr id="8" name="Picture 7"/>
+            <p:cNvPicPr>
+              <a:picLocks noChangeAspect="1"/>
+            </p:cNvPicPr>
+            <p:nvPr/>
+          </p:nvPicPr>
+          <p:blipFill>
+            <a:blip r:embed="rId5"/>
+            <a:stretch>
+              <a:fillRect/>
+            </a:stretch>
+          </p:blipFill>
+          <p:spPr>
+            <a:xfrm>
+              <a:off x="5002273" y="5668650"/>
+              <a:ext cx="3749373" cy="294762"/>
+            </a:xfrm>
+            <a:prstGeom prst="rect">
+              <a:avLst/>
+            </a:prstGeom>
+          </p:spPr>
+        </p:pic>
+        <p:cxnSp>
+          <p:nvCxnSpPr>
+            <p:cNvPr id="10" name="Straight Arrow Connector 9"/>
+            <p:cNvCxnSpPr/>
+            <p:nvPr/>
+          </p:nvCxnSpPr>
+          <p:spPr>
+            <a:xfrm flipV="1">
+              <a:off x="3390201" y="4670166"/>
+              <a:ext cx="1603203" cy="174004"/>
+            </a:xfrm>
+            <a:prstGeom prst="straightConnector1">
+              <a:avLst/>
+            </a:prstGeom>
+            <a:ln>
+              <a:tailEnd type="triangle"/>
+            </a:ln>
+          </p:spPr>
+          <p:style>
+            <a:lnRef idx="1">
+              <a:schemeClr val="accent1"/>
+            </a:lnRef>
+            <a:fillRef idx="0">
+              <a:schemeClr val="accent1"/>
+            </a:fillRef>
+            <a:effectRef idx="0">
+              <a:schemeClr val="accent1"/>
+            </a:effectRef>
+            <a:fontRef idx="minor">
+              <a:schemeClr val="tx1"/>
+            </a:fontRef>
+          </p:style>
+        </p:cxnSp>
+        <p:cxnSp>
+          <p:nvCxnSpPr>
+            <p:cNvPr id="15" name="Straight Arrow Connector 14"/>
+            <p:cNvCxnSpPr>
+              <a:endCxn id="8" idx="1"/>
+            </p:cNvCxnSpPr>
+            <p:nvPr/>
+          </p:nvCxnSpPr>
+          <p:spPr>
+            <a:xfrm>
+              <a:off x="3381333" y="5668650"/>
+              <a:ext cx="1620940" cy="147381"/>
+            </a:xfrm>
+            <a:prstGeom prst="straightConnector1">
+              <a:avLst/>
+            </a:prstGeom>
+            <a:ln>
+              <a:tailEnd type="triangle"/>
+            </a:ln>
+          </p:spPr>
+          <p:style>
+            <a:lnRef idx="1">
+              <a:schemeClr val="accent1"/>
+            </a:lnRef>
+            <a:fillRef idx="0">
+              <a:schemeClr val="accent1"/>
+            </a:fillRef>
+            <a:effectRef idx="0">
+              <a:schemeClr val="accent1"/>
+            </a:effectRef>
+            <a:fontRef idx="minor">
+              <a:schemeClr val="tx1"/>
+            </a:fontRef>
+          </p:style>
+        </p:cxnSp>
+        <p:sp>
+          <p:nvSpPr>
+            <p:cNvPr id="16" name="TextBox 15"/>
+            <p:cNvSpPr txBox="1"/>
+            <p:nvPr/>
+          </p:nvSpPr>
+          <p:spPr>
+            <a:xfrm>
+              <a:off x="3798512" y="4572502"/>
+              <a:ext cx="776749" cy="369332"/>
+            </a:xfrm>
+            <a:prstGeom prst="rect">
+              <a:avLst/>
+            </a:prstGeom>
+            <a:noFill/>
+          </p:spPr>
+          <p:txBody>
+            <a:bodyPr wrap="square" rtlCol="0">
+              <a:spAutoFit/>
+            </a:bodyPr>
+            <a:lstStyle/>
+            <a:p>
+              <a:r>
+                <a:rPr lang="fr-FR" dirty="0" smtClean="0"/>
+                <a:t>state</a:t>
+              </a:r>
+              <a:endParaRPr lang="fr-FR" dirty="0"/>
+            </a:p>
+          </p:txBody>
+        </p:sp>
+        <p:sp>
+          <p:nvSpPr>
+            <p:cNvPr id="17" name="TextBox 16"/>
+            <p:cNvSpPr txBox="1"/>
+            <p:nvPr/>
+          </p:nvSpPr>
+          <p:spPr>
+            <a:xfrm>
+              <a:off x="3798512" y="5502108"/>
+              <a:ext cx="786581" cy="369332"/>
+            </a:xfrm>
+            <a:prstGeom prst="rect">
+              <a:avLst/>
+            </a:prstGeom>
+            <a:noFill/>
+          </p:spPr>
+          <p:txBody>
+            <a:bodyPr wrap="square" rtlCol="0">
+              <a:spAutoFit/>
+            </a:bodyPr>
+            <a:lstStyle/>
+            <a:p>
+              <a:r>
+                <a:rPr lang="fr-FR" dirty="0" err="1" smtClean="0"/>
+                <a:t>props</a:t>
+              </a:r>
+              <a:endParaRPr lang="fr-FR" dirty="0"/>
+            </a:p>
+          </p:txBody>
+        </p:sp>
+      </p:grpSp>
+      <p:pic>
+        <p:nvPicPr>
+          <p:cNvPr id="20" name="Picture 19"/>
+          <p:cNvPicPr>
+            <a:picLocks noChangeAspect="1"/>
+          </p:cNvPicPr>
+          <p:nvPr/>
+        </p:nvPicPr>
+        <p:blipFill>
+          <a:blip r:embed="rId6"/>
+          <a:stretch>
+            <a:fillRect/>
+          </a:stretch>
+        </p:blipFill>
+        <p:spPr>
+          <a:xfrm>
+            <a:off x="6983814" y="781794"/>
+            <a:ext cx="4133850" cy="2628900"/>
+          </a:xfrm>
+          <a:prstGeom prst="rect">
+            <a:avLst/>
+          </a:prstGeom>
+        </p:spPr>
+      </p:pic>
+      <p:sp>
+        <p:nvSpPr>
+          <p:cNvPr id="21" name="Footer Placeholder 20"/>
+          <p:cNvSpPr>
+            <a:spLocks noGrp="1"/>
+          </p:cNvSpPr>
+          <p:nvPr>
+            <p:ph type="ftr" sz="quarter" idx="11"/>
+          </p:nvPr>
+        </p:nvSpPr>
+        <p:spPr>
+          <a:xfrm>
+            <a:off x="686202" y="5438461"/>
+            <a:ext cx="6297612" cy="365125"/>
+          </a:xfrm>
+        </p:spPr>
+        <p:txBody>
+          <a:bodyPr/>
+          <a:lstStyle/>
+          <a:p>
+            <a:r>
+              <a:rPr lang="en-US" smtClean="0"/>
+              <a:t>Bois Cédric - Master WIC</a:t>
+            </a:r>
+            <a:endParaRPr lang="en-US" dirty="0"/>
+          </a:p>
+        </p:txBody>
+      </p:sp>
+      <p:sp>
+        <p:nvSpPr>
+          <p:cNvPr id="22" name="Slide Number Placeholder 21"/>
+          <p:cNvSpPr>
+            <a:spLocks noGrp="1"/>
+          </p:cNvSpPr>
+          <p:nvPr>
+            <p:ph type="sldNum" sz="quarter" idx="12"/>
+          </p:nvPr>
+        </p:nvSpPr>
+        <p:spPr/>
+        <p:txBody>
+          <a:bodyPr/>
+          <a:lstStyle/>
+          <a:p>
+            <a:fld id="{D57F1E4F-1CFF-5643-939E-217C01CDF565}" type="slidenum">
+              <a:rPr lang="en-US" smtClean="0"/>
+              <a:pPr/>
+              <a:t>7</a:t>
+            </a:fld>
+            <a:endParaRPr lang="en-US" dirty="0"/>
           </a:p>
         </p:txBody>
       </p:sp>
     </p:spTree>
     <p:extLst>
       <p:ext uri="{BB962C8B-B14F-4D97-AF65-F5344CB8AC3E}">
-        <p14:creationId xmlns:p14="http://schemas.microsoft.com/office/powerpoint/2010/main" val="3553190663"/>
+        <p14:creationId xmlns:p14="http://schemas.microsoft.com/office/powerpoint/2010/main" val="2798793777"/>
       </p:ext>
     </p:extLst>
   </p:cSld>
   <p:clrMapOvr>
     <a:masterClrMapping/>
   </p:clrMapOvr>
+  <p:timing>
+    <p:tnLst>
+      <p:par>
+        <p:cTn id="1" dur="indefinite" restart="never" nodeType="tmRoot"/>
+      </p:par>
+    </p:tnLst>
+  </p:timing>
 </p:sld>
 </file>
 
@@ -7299,11 +9312,11 @@
           <a:p>
             <a:r>
               <a:rPr lang="fr-FR" dirty="0" err="1" smtClean="0"/>
-              <a:t>Xen</a:t>
+              <a:t>withState</a:t>
             </a:r>
             <a:r>
               <a:rPr lang="fr-FR" dirty="0" smtClean="0"/>
-              <a:t> Orchestra</a:t>
+              <a:t> : Conception </a:t>
             </a:r>
             <a:endParaRPr lang="fr-FR" dirty="0"/>
           </a:p>
@@ -7324,14 +9337,320 @@
           <a:bodyPr/>
           <a:lstStyle/>
           <a:p>
-            <a:endParaRPr lang="fr-FR"/>
+            <a:endParaRPr lang="fr-FR" dirty="0"/>
+          </a:p>
+        </p:txBody>
+      </p:sp>
+      <p:pic>
+        <p:nvPicPr>
+          <p:cNvPr id="7" name="Picture 6"/>
+          <p:cNvPicPr>
+            <a:picLocks noChangeAspect="1"/>
+          </p:cNvPicPr>
+          <p:nvPr/>
+        </p:nvPicPr>
+        <p:blipFill>
+          <a:blip r:embed="rId3"/>
+          <a:stretch>
+            <a:fillRect/>
+          </a:stretch>
+        </p:blipFill>
+        <p:spPr>
+          <a:xfrm>
+            <a:off x="5068601" y="3511807"/>
+            <a:ext cx="3470242" cy="1982995"/>
+          </a:xfrm>
+          <a:prstGeom prst="rect">
+            <a:avLst/>
+          </a:prstGeom>
+        </p:spPr>
+      </p:pic>
+      <p:pic>
+        <p:nvPicPr>
+          <p:cNvPr id="9" name="Picture 8"/>
+          <p:cNvPicPr>
+            <a:picLocks noChangeAspect="1"/>
+          </p:cNvPicPr>
+          <p:nvPr/>
+        </p:nvPicPr>
+        <p:blipFill>
+          <a:blip r:embed="rId4"/>
+          <a:stretch>
+            <a:fillRect/>
+          </a:stretch>
+        </p:blipFill>
+        <p:spPr>
+          <a:xfrm>
+            <a:off x="84405" y="2009671"/>
+            <a:ext cx="4891263" cy="4212818"/>
+          </a:xfrm>
+          <a:prstGeom prst="rect">
+            <a:avLst/>
+          </a:prstGeom>
+        </p:spPr>
+      </p:pic>
+      <p:pic>
+        <p:nvPicPr>
+          <p:cNvPr id="11" name="Picture 10"/>
+          <p:cNvPicPr>
+            <a:picLocks noChangeAspect="1"/>
+          </p:cNvPicPr>
+          <p:nvPr/>
+        </p:nvPicPr>
+        <p:blipFill>
+          <a:blip r:embed="rId5"/>
+          <a:stretch>
+            <a:fillRect/>
+          </a:stretch>
+        </p:blipFill>
+        <p:spPr>
+          <a:xfrm>
+            <a:off x="8631777" y="1769806"/>
+            <a:ext cx="3438179" cy="4003728"/>
+          </a:xfrm>
+          <a:prstGeom prst="rect">
+            <a:avLst/>
+          </a:prstGeom>
+        </p:spPr>
+      </p:pic>
+      <p:sp>
+        <p:nvSpPr>
+          <p:cNvPr id="12" name="Footer Placeholder 11"/>
+          <p:cNvSpPr>
+            <a:spLocks noGrp="1"/>
+          </p:cNvSpPr>
+          <p:nvPr>
+            <p:ph type="ftr" sz="quarter" idx="11"/>
+          </p:nvPr>
+        </p:nvSpPr>
+        <p:spPr/>
+        <p:txBody>
+          <a:bodyPr/>
+          <a:lstStyle/>
+          <a:p>
+            <a:r>
+              <a:rPr lang="en-US" smtClean="0"/>
+              <a:t>Bois Cédric - Master WIC</a:t>
+            </a:r>
+            <a:endParaRPr lang="en-US" dirty="0"/>
+          </a:p>
+        </p:txBody>
+      </p:sp>
+      <p:sp>
+        <p:nvSpPr>
+          <p:cNvPr id="13" name="Slide Number Placeholder 12"/>
+          <p:cNvSpPr>
+            <a:spLocks noGrp="1"/>
+          </p:cNvSpPr>
+          <p:nvPr>
+            <p:ph type="sldNum" sz="quarter" idx="12"/>
+          </p:nvPr>
+        </p:nvSpPr>
+        <p:spPr/>
+        <p:txBody>
+          <a:bodyPr/>
+          <a:lstStyle/>
+          <a:p>
+            <a:fld id="{D57F1E4F-1CFF-5643-939E-217C01CDF565}" type="slidenum">
+              <a:rPr lang="en-US" smtClean="0"/>
+              <a:pPr/>
+              <a:t>8</a:t>
+            </a:fld>
+            <a:endParaRPr lang="en-US" dirty="0"/>
           </a:p>
         </p:txBody>
       </p:sp>
     </p:spTree>
     <p:extLst>
       <p:ext uri="{BB962C8B-B14F-4D97-AF65-F5344CB8AC3E}">
-        <p14:creationId xmlns:p14="http://schemas.microsoft.com/office/powerpoint/2010/main" val="723456919"/>
+        <p14:creationId xmlns:p14="http://schemas.microsoft.com/office/powerpoint/2010/main" val="3536174779"/>
+      </p:ext>
+    </p:extLst>
+  </p:cSld>
+  <p:clrMapOvr>
+    <a:masterClrMapping/>
+  </p:clrMapOvr>
+  <p:timing>
+    <p:tnLst>
+      <p:par>
+        <p:cTn id="1" dur="indefinite" restart="never" nodeType="tmRoot"/>
+      </p:par>
+    </p:tnLst>
+  </p:timing>
+</p:sld>
+</file>
+
+<file path=ppt/slides/slide9.xml><?xml version="1.0" encoding="utf-8"?>
+<p:sld xmlns:a="http://schemas.openxmlformats.org/drawingml/2006/main" xmlns:r="http://schemas.openxmlformats.org/officeDocument/2006/relationships" xmlns:p="http://schemas.openxmlformats.org/presentationml/2006/main">
+  <p:cSld>
+    <p:spTree>
+      <p:nvGrpSpPr>
+        <p:cNvPr id="1" name=""/>
+        <p:cNvGrpSpPr/>
+        <p:nvPr/>
+      </p:nvGrpSpPr>
+      <p:grpSpPr>
+        <a:xfrm>
+          <a:off x="0" y="0"/>
+          <a:ext cx="0" cy="0"/>
+          <a:chOff x="0" y="0"/>
+          <a:chExt cx="0" cy="0"/>
+        </a:xfrm>
+      </p:grpSpPr>
+      <p:sp>
+        <p:nvSpPr>
+          <p:cNvPr id="2" name="Title 1"/>
+          <p:cNvSpPr>
+            <a:spLocks noGrp="1"/>
+          </p:cNvSpPr>
+          <p:nvPr>
+            <p:ph type="title"/>
+          </p:nvPr>
+        </p:nvSpPr>
+        <p:spPr/>
+        <p:txBody>
+          <a:bodyPr/>
+          <a:lstStyle/>
+          <a:p>
+            <a:r>
+              <a:rPr lang="fr-FR" dirty="0" err="1" smtClean="0"/>
+              <a:t>withState</a:t>
+            </a:r>
+            <a:r>
+              <a:rPr lang="fr-FR" dirty="0" smtClean="0"/>
+              <a:t> : développement</a:t>
+            </a:r>
+            <a:endParaRPr lang="fr-FR" dirty="0"/>
+          </a:p>
+        </p:txBody>
+      </p:sp>
+      <p:sp>
+        <p:nvSpPr>
+          <p:cNvPr id="3" name="Content Placeholder 2"/>
+          <p:cNvSpPr>
+            <a:spLocks noGrp="1"/>
+          </p:cNvSpPr>
+          <p:nvPr>
+            <p:ph idx="1"/>
+          </p:nvPr>
+        </p:nvSpPr>
+        <p:spPr>
+          <a:xfrm>
+            <a:off x="667286" y="2160589"/>
+            <a:ext cx="8596668" cy="3880773"/>
+          </a:xfrm>
+        </p:spPr>
+        <p:txBody>
+          <a:bodyPr/>
+          <a:lstStyle/>
+          <a:p>
+            <a:r>
+              <a:rPr lang="fr-FR" dirty="0" smtClean="0"/>
+              <a:t>Structure :</a:t>
+            </a:r>
+            <a:endParaRPr lang="fr-FR" dirty="0"/>
+          </a:p>
+        </p:txBody>
+      </p:sp>
+      <p:pic>
+        <p:nvPicPr>
+          <p:cNvPr id="5" name="Picture 4"/>
+          <p:cNvPicPr>
+            <a:picLocks noChangeAspect="1"/>
+          </p:cNvPicPr>
+          <p:nvPr/>
+        </p:nvPicPr>
+        <p:blipFill>
+          <a:blip r:embed="rId2"/>
+          <a:stretch>
+            <a:fillRect/>
+          </a:stretch>
+        </p:blipFill>
+        <p:spPr>
+          <a:xfrm>
+            <a:off x="1510666" y="3940412"/>
+            <a:ext cx="2735980" cy="321125"/>
+          </a:xfrm>
+          <a:prstGeom prst="rect">
+            <a:avLst/>
+          </a:prstGeom>
+        </p:spPr>
+      </p:pic>
+      <p:pic>
+        <p:nvPicPr>
+          <p:cNvPr id="8" name="Picture 7"/>
+          <p:cNvPicPr>
+            <a:picLocks noChangeAspect="1"/>
+          </p:cNvPicPr>
+          <p:nvPr/>
+        </p:nvPicPr>
+        <p:blipFill>
+          <a:blip r:embed="rId3"/>
+          <a:stretch>
+            <a:fillRect/>
+          </a:stretch>
+        </p:blipFill>
+        <p:spPr>
+          <a:xfrm>
+            <a:off x="5206304" y="2160589"/>
+            <a:ext cx="4057650" cy="3067050"/>
+          </a:xfrm>
+          <a:prstGeom prst="rect">
+            <a:avLst/>
+          </a:prstGeom>
+        </p:spPr>
+      </p:pic>
+      <p:sp>
+        <p:nvSpPr>
+          <p:cNvPr id="9" name="Footer Placeholder 8"/>
+          <p:cNvSpPr>
+            <a:spLocks noGrp="1"/>
+          </p:cNvSpPr>
+          <p:nvPr>
+            <p:ph type="ftr" sz="quarter" idx="11"/>
+          </p:nvPr>
+        </p:nvSpPr>
+        <p:spPr/>
+        <p:txBody>
+          <a:bodyPr/>
+          <a:lstStyle/>
+          <a:p>
+            <a:r>
+              <a:rPr lang="en-US" smtClean="0"/>
+              <a:t>Bois Cédric - Master WIC</a:t>
+            </a:r>
+            <a:endParaRPr lang="en-US" dirty="0"/>
+          </a:p>
+        </p:txBody>
+      </p:sp>
+      <p:sp>
+        <p:nvSpPr>
+          <p:cNvPr id="10" name="Slide Number Placeholder 9"/>
+          <p:cNvSpPr>
+            <a:spLocks noGrp="1"/>
+          </p:cNvSpPr>
+          <p:nvPr>
+            <p:ph type="sldNum" sz="quarter" idx="12"/>
+          </p:nvPr>
+        </p:nvSpPr>
+        <p:spPr/>
+        <p:txBody>
+          <a:bodyPr/>
+          <a:lstStyle/>
+          <a:p>
+            <a:fld id="{D57F1E4F-1CFF-5643-939E-217C01CDF565}" type="slidenum">
+              <a:rPr lang="en-US" smtClean="0"/>
+              <a:pPr/>
+              <a:t>9</a:t>
+            </a:fld>
+            <a:endParaRPr lang="en-US" dirty="0"/>
+          </a:p>
+        </p:txBody>
+      </p:sp>
+    </p:spTree>
+    <p:extLst>
+      <p:ext uri="{BB962C8B-B14F-4D97-AF65-F5344CB8AC3E}">
+        <p14:creationId xmlns:p14="http://schemas.microsoft.com/office/powerpoint/2010/main" val="3241992925"/>
       </p:ext>
     </p:extLst>
   </p:cSld>

</xml_diff>